<commit_message>
Add some codes from deep learning from scratch
</commit_message>
<xml_diff>
--- a/ppt/4. 퍼셉트론 및 신경망.pptx
+++ b/ppt/4. 퍼셉트론 및 신경망.pptx
@@ -8,13 +8,17 @@
     <p:sldId id="256" r:id="rId2"/>
     <p:sldId id="257" r:id="rId3"/>
     <p:sldId id="258" r:id="rId4"/>
-    <p:sldId id="297" r:id="rId5"/>
-    <p:sldId id="298" r:id="rId6"/>
-    <p:sldId id="299" r:id="rId7"/>
-    <p:sldId id="300" r:id="rId8"/>
-    <p:sldId id="301" r:id="rId9"/>
-    <p:sldId id="295" r:id="rId10"/>
-    <p:sldId id="296" r:id="rId11"/>
+    <p:sldId id="302" r:id="rId5"/>
+    <p:sldId id="297" r:id="rId6"/>
+    <p:sldId id="298" r:id="rId7"/>
+    <p:sldId id="299" r:id="rId8"/>
+    <p:sldId id="300" r:id="rId9"/>
+    <p:sldId id="301" r:id="rId10"/>
+    <p:sldId id="303" r:id="rId11"/>
+    <p:sldId id="304" r:id="rId12"/>
+    <p:sldId id="305" r:id="rId13"/>
+    <p:sldId id="295" r:id="rId14"/>
+    <p:sldId id="296" r:id="rId15"/>
   </p:sldIdLst>
   <p:sldSz cx="12192000" cy="6858000"/>
   <p:notesSz cx="6858000" cy="9144000"/>
@@ -254,7 +258,7 @@
           <a:p>
             <a:fld id="{4A61891F-26D4-4EED-9BA8-111B4F671ED2}" type="datetimeFigureOut">
               <a:rPr lang="ko-KR" altLang="en-US" smtClean="0"/>
-              <a:t>2017-07-24</a:t>
+              <a:t>2017-07-25</a:t>
             </a:fld>
             <a:endParaRPr lang="ko-KR" altLang="en-US"/>
           </a:p>
@@ -541,7 +545,7 @@
           <a:p>
             <a:fld id="{4A61891F-26D4-4EED-9BA8-111B4F671ED2}" type="datetimeFigureOut">
               <a:rPr lang="ko-KR" altLang="en-US" smtClean="0"/>
-              <a:t>2017-07-24</a:t>
+              <a:t>2017-07-25</a:t>
             </a:fld>
             <a:endParaRPr lang="ko-KR" altLang="en-US"/>
           </a:p>
@@ -733,7 +737,7 @@
           <a:p>
             <a:fld id="{4A61891F-26D4-4EED-9BA8-111B4F671ED2}" type="datetimeFigureOut">
               <a:rPr lang="ko-KR" altLang="en-US" smtClean="0"/>
-              <a:t>2017-07-24</a:t>
+              <a:t>2017-07-25</a:t>
             </a:fld>
             <a:endParaRPr lang="ko-KR" altLang="en-US"/>
           </a:p>
@@ -994,7 +998,7 @@
           <a:p>
             <a:fld id="{4A61891F-26D4-4EED-9BA8-111B4F671ED2}" type="datetimeFigureOut">
               <a:rPr lang="ko-KR" altLang="en-US" smtClean="0"/>
-              <a:t>2017-07-24</a:t>
+              <a:t>2017-07-25</a:t>
             </a:fld>
             <a:endParaRPr lang="ko-KR" altLang="en-US"/>
           </a:p>
@@ -1418,7 +1422,7 @@
           <a:p>
             <a:fld id="{4A61891F-26D4-4EED-9BA8-111B4F671ED2}" type="datetimeFigureOut">
               <a:rPr lang="ko-KR" altLang="en-US" smtClean="0"/>
-              <a:t>2017-07-24</a:t>
+              <a:t>2017-07-25</a:t>
             </a:fld>
             <a:endParaRPr lang="ko-KR" altLang="en-US"/>
           </a:p>
@@ -1964,7 +1968,7 @@
           <a:p>
             <a:fld id="{4A61891F-26D4-4EED-9BA8-111B4F671ED2}" type="datetimeFigureOut">
               <a:rPr lang="ko-KR" altLang="en-US" smtClean="0"/>
-              <a:t>2017-07-24</a:t>
+              <a:t>2017-07-25</a:t>
             </a:fld>
             <a:endParaRPr lang="ko-KR" altLang="en-US"/>
           </a:p>
@@ -2804,7 +2808,7 @@
           <a:p>
             <a:fld id="{4A61891F-26D4-4EED-9BA8-111B4F671ED2}" type="datetimeFigureOut">
               <a:rPr lang="ko-KR" altLang="en-US" smtClean="0"/>
-              <a:t>2017-07-24</a:t>
+              <a:t>2017-07-25</a:t>
             </a:fld>
             <a:endParaRPr lang="ko-KR" altLang="en-US"/>
           </a:p>
@@ -2974,7 +2978,7 @@
           <a:p>
             <a:fld id="{4A61891F-26D4-4EED-9BA8-111B4F671ED2}" type="datetimeFigureOut">
               <a:rPr lang="ko-KR" altLang="en-US" smtClean="0"/>
-              <a:t>2017-07-24</a:t>
+              <a:t>2017-07-25</a:t>
             </a:fld>
             <a:endParaRPr lang="ko-KR" altLang="en-US"/>
           </a:p>
@@ -3158,7 +3162,7 @@
           <a:p>
             <a:fld id="{4A61891F-26D4-4EED-9BA8-111B4F671ED2}" type="datetimeFigureOut">
               <a:rPr lang="ko-KR" altLang="en-US" smtClean="0"/>
-              <a:t>2017-07-24</a:t>
+              <a:t>2017-07-25</a:t>
             </a:fld>
             <a:endParaRPr lang="ko-KR" altLang="en-US"/>
           </a:p>
@@ -3328,7 +3332,7 @@
           <a:p>
             <a:fld id="{4A61891F-26D4-4EED-9BA8-111B4F671ED2}" type="datetimeFigureOut">
               <a:rPr lang="ko-KR" altLang="en-US" smtClean="0"/>
-              <a:t>2017-07-24</a:t>
+              <a:t>2017-07-25</a:t>
             </a:fld>
             <a:endParaRPr lang="ko-KR" altLang="en-US"/>
           </a:p>
@@ -3576,7 +3580,7 @@
           <a:p>
             <a:fld id="{4A61891F-26D4-4EED-9BA8-111B4F671ED2}" type="datetimeFigureOut">
               <a:rPr lang="ko-KR" altLang="en-US" smtClean="0"/>
-              <a:t>2017-07-24</a:t>
+              <a:t>2017-07-25</a:t>
             </a:fld>
             <a:endParaRPr lang="ko-KR" altLang="en-US"/>
           </a:p>
@@ -3813,7 +3817,7 @@
           <a:p>
             <a:fld id="{4A61891F-26D4-4EED-9BA8-111B4F671ED2}" type="datetimeFigureOut">
               <a:rPr lang="ko-KR" altLang="en-US" smtClean="0"/>
-              <a:t>2017-07-24</a:t>
+              <a:t>2017-07-25</a:t>
             </a:fld>
             <a:endParaRPr lang="ko-KR" altLang="en-US"/>
           </a:p>
@@ -4186,7 +4190,7 @@
           <a:p>
             <a:fld id="{4A61891F-26D4-4EED-9BA8-111B4F671ED2}" type="datetimeFigureOut">
               <a:rPr lang="ko-KR" altLang="en-US" smtClean="0"/>
-              <a:t>2017-07-24</a:t>
+              <a:t>2017-07-25</a:t>
             </a:fld>
             <a:endParaRPr lang="ko-KR" altLang="en-US"/>
           </a:p>
@@ -4304,7 +4308,7 @@
           <a:p>
             <a:fld id="{4A61891F-26D4-4EED-9BA8-111B4F671ED2}" type="datetimeFigureOut">
               <a:rPr lang="ko-KR" altLang="en-US" smtClean="0"/>
-              <a:t>2017-07-24</a:t>
+              <a:t>2017-07-25</a:t>
             </a:fld>
             <a:endParaRPr lang="ko-KR" altLang="en-US"/>
           </a:p>
@@ -4399,7 +4403,7 @@
           <a:p>
             <a:fld id="{4A61891F-26D4-4EED-9BA8-111B4F671ED2}" type="datetimeFigureOut">
               <a:rPr lang="ko-KR" altLang="en-US" smtClean="0"/>
-              <a:t>2017-07-24</a:t>
+              <a:t>2017-07-25</a:t>
             </a:fld>
             <a:endParaRPr lang="ko-KR" altLang="en-US"/>
           </a:p>
@@ -4650,7 +4654,7 @@
           <a:p>
             <a:fld id="{4A61891F-26D4-4EED-9BA8-111B4F671ED2}" type="datetimeFigureOut">
               <a:rPr lang="ko-KR" altLang="en-US" smtClean="0"/>
-              <a:t>2017-07-24</a:t>
+              <a:t>2017-07-25</a:t>
             </a:fld>
             <a:endParaRPr lang="ko-KR" altLang="en-US"/>
           </a:p>
@@ -4937,7 +4941,7 @@
           <a:p>
             <a:fld id="{4A61891F-26D4-4EED-9BA8-111B4F671ED2}" type="datetimeFigureOut">
               <a:rPr lang="ko-KR" altLang="en-US" smtClean="0"/>
-              <a:t>2017-07-24</a:t>
+              <a:t>2017-07-25</a:t>
             </a:fld>
             <a:endParaRPr lang="ko-KR" altLang="en-US"/>
           </a:p>
@@ -5150,7 +5154,7 @@
           <a:p>
             <a:fld id="{4A61891F-26D4-4EED-9BA8-111B4F671ED2}" type="datetimeFigureOut">
               <a:rPr lang="ko-KR" altLang="en-US" smtClean="0"/>
-              <a:t>2017-07-24</a:t>
+              <a:t>2017-07-25</a:t>
             </a:fld>
             <a:endParaRPr lang="ko-KR" altLang="en-US"/>
           </a:p>
@@ -5757,8 +5761,923 @@
           <a:lstStyle/>
           <a:p>
             <a:r>
+              <a:rPr lang="en-US" altLang="ko-KR" dirty="0" smtClean="0"/>
+              <a:t>Example 1) and, or, </a:t>
+            </a:r>
+            <a:r>
+              <a:rPr lang="en-US" altLang="ko-KR" dirty="0" err="1" smtClean="0"/>
+              <a:t>nand</a:t>
+            </a:r>
+            <a:r>
+              <a:rPr lang="en-US" altLang="ko-KR" dirty="0" smtClean="0"/>
+              <a:t>, </a:t>
+            </a:r>
+            <a:r>
+              <a:rPr lang="en-US" altLang="ko-KR" dirty="0" err="1" smtClean="0"/>
+              <a:t>xor</a:t>
+            </a:r>
+            <a:endParaRPr lang="en-US" altLang="ko-KR" dirty="0"/>
+          </a:p>
+        </p:txBody>
+      </p:sp>
+      <p:sp>
+        <p:nvSpPr>
+          <p:cNvPr id="6" name="내용 개체 틀 3"/>
+          <p:cNvSpPr>
+            <a:spLocks noGrp="1"/>
+          </p:cNvSpPr>
+          <p:nvPr>
+            <p:ph idx="1"/>
+          </p:nvPr>
+        </p:nvSpPr>
+        <p:spPr>
+          <a:xfrm>
+            <a:off x="838200" y="1825625"/>
+            <a:ext cx="10429356" cy="4351338"/>
+          </a:xfrm>
+        </p:spPr>
+        <p:txBody>
+          <a:bodyPr>
+            <a:normAutofit/>
+          </a:bodyPr>
+          <a:lstStyle/>
+          <a:p>
+            <a:endParaRPr lang="en-US" altLang="ko-KR" dirty="0"/>
+          </a:p>
+        </p:txBody>
+      </p:sp>
+      <p:pic>
+        <p:nvPicPr>
+          <p:cNvPr id="7" name="그림 6"/>
+          <p:cNvPicPr>
+            <a:picLocks noChangeAspect="1"/>
+          </p:cNvPicPr>
+          <p:nvPr/>
+        </p:nvPicPr>
+        <p:blipFill rotWithShape="1">
+          <a:blip r:embed="rId2"/>
+          <a:srcRect l="7582" t="13042" r="8827" b="11244"/>
+          <a:stretch/>
+        </p:blipFill>
+        <p:spPr>
+          <a:xfrm>
+            <a:off x="838200" y="1690687"/>
+            <a:ext cx="10515600" cy="4834803"/>
+          </a:xfrm>
+          <a:prstGeom prst="rect">
+            <a:avLst/>
+          </a:prstGeom>
+        </p:spPr>
+      </p:pic>
+    </p:spTree>
+    <p:extLst>
+      <p:ext uri="{BB962C8B-B14F-4D97-AF65-F5344CB8AC3E}">
+        <p14:creationId xmlns:p14="http://schemas.microsoft.com/office/powerpoint/2010/main" val="2172859562"/>
+      </p:ext>
+    </p:extLst>
+  </p:cSld>
+  <p:clrMapOvr>
+    <a:masterClrMapping/>
+  </p:clrMapOvr>
+  <p:timing>
+    <p:tnLst>
+      <p:par>
+        <p:cTn id="1" dur="indefinite" restart="never" nodeType="tmRoot"/>
+      </p:par>
+    </p:tnLst>
+  </p:timing>
+</p:sld>
+</file>
+
+<file path=ppt/slides/slide11.xml><?xml version="1.0" encoding="utf-8"?>
+<p:sld xmlns:a="http://schemas.openxmlformats.org/drawingml/2006/main" xmlns:r="http://schemas.openxmlformats.org/officeDocument/2006/relationships" xmlns:p="http://schemas.openxmlformats.org/presentationml/2006/main">
+  <p:cSld>
+    <p:spTree>
+      <p:nvGrpSpPr>
+        <p:cNvPr id="1" name=""/>
+        <p:cNvGrpSpPr/>
+        <p:nvPr/>
+      </p:nvGrpSpPr>
+      <p:grpSpPr>
+        <a:xfrm>
+          <a:off x="0" y="0"/>
+          <a:ext cx="0" cy="0"/>
+          <a:chOff x="0" y="0"/>
+          <a:chExt cx="0" cy="0"/>
+        </a:xfrm>
+      </p:grpSpPr>
+      <p:sp>
+        <p:nvSpPr>
+          <p:cNvPr id="2" name="제목 1"/>
+          <p:cNvSpPr>
+            <a:spLocks noGrp="1"/>
+          </p:cNvSpPr>
+          <p:nvPr>
+            <p:ph type="title"/>
+          </p:nvPr>
+        </p:nvSpPr>
+        <p:spPr/>
+        <p:txBody>
+          <a:bodyPr/>
+          <a:lstStyle/>
+          <a:p>
+            <a:r>
+              <a:rPr lang="en-US" altLang="ko-KR" dirty="0" smtClean="0"/>
+              <a:t>Example 1) and, or, </a:t>
+            </a:r>
+            <a:r>
+              <a:rPr lang="en-US" altLang="ko-KR" dirty="0" err="1" smtClean="0"/>
+              <a:t>nand</a:t>
+            </a:r>
+            <a:r>
+              <a:rPr lang="en-US" altLang="ko-KR" dirty="0" smtClean="0"/>
+              <a:t>, </a:t>
+            </a:r>
+            <a:r>
+              <a:rPr lang="en-US" altLang="ko-KR" dirty="0" err="1" smtClean="0"/>
+              <a:t>xor</a:t>
+            </a:r>
+            <a:endParaRPr lang="en-US" altLang="ko-KR" dirty="0"/>
+          </a:p>
+        </p:txBody>
+      </p:sp>
+      <mc:AlternateContent xmlns:mc="http://schemas.openxmlformats.org/markup-compatibility/2006">
+        <mc:Choice xmlns:a14="http://schemas.microsoft.com/office/drawing/2010/main" Requires="a14">
+          <p:sp>
+            <p:nvSpPr>
+              <p:cNvPr id="6" name="내용 개체 틀 3"/>
+              <p:cNvSpPr>
+                <a:spLocks noGrp="1"/>
+              </p:cNvSpPr>
+              <p:nvPr>
+                <p:ph idx="1"/>
+              </p:nvPr>
+            </p:nvSpPr>
+            <p:spPr>
+              <a:xfrm>
+                <a:off x="838200" y="1825625"/>
+                <a:ext cx="10429356" cy="4351338"/>
+              </a:xfrm>
+            </p:spPr>
+            <p:txBody>
+              <a:bodyPr>
+                <a:normAutofit/>
+              </a:bodyPr>
+              <a:lstStyle/>
+              <a:p>
+                <a:r>
+                  <a:rPr lang="en-US" altLang="ko-KR" dirty="0" smtClean="0"/>
+                  <a:t>NAND</a:t>
+                </a:r>
+              </a:p>
+              <a:p>
+                <a:pPr lvl="1"/>
+                <a14:m>
+                  <m:oMath xmlns:m="http://schemas.openxmlformats.org/officeDocument/2006/math">
+                    <m:r>
+                      <a:rPr lang="en-US" altLang="ko-KR" sz="2200" b="0" i="1" smtClean="0">
+                        <a:latin typeface="Cambria Math" panose="02040503050406030204" pitchFamily="18" charset="0"/>
+                      </a:rPr>
+                      <m:t>𝑦</m:t>
+                    </m:r>
+                    <m:r>
+                      <a:rPr lang="en-US" altLang="ko-KR" sz="2200" b="0" i="1" smtClean="0">
+                        <a:latin typeface="Cambria Math" panose="02040503050406030204" pitchFamily="18" charset="0"/>
+                      </a:rPr>
+                      <m:t>=−0.5</m:t>
+                    </m:r>
+                    <m:sSub>
+                      <m:sSubPr>
+                        <m:ctrlPr>
+                          <a:rPr lang="en-US" altLang="ko-KR" sz="2200" b="0" i="1" smtClean="0">
+                            <a:latin typeface="Cambria Math" panose="02040503050406030204" pitchFamily="18" charset="0"/>
+                          </a:rPr>
+                        </m:ctrlPr>
+                      </m:sSubPr>
+                      <m:e>
+                        <m:r>
+                          <a:rPr lang="en-US" altLang="ko-KR" sz="2200" b="0" i="1" smtClean="0">
+                            <a:latin typeface="Cambria Math" panose="02040503050406030204" pitchFamily="18" charset="0"/>
+                          </a:rPr>
+                          <m:t>𝑥</m:t>
+                        </m:r>
+                      </m:e>
+                      <m:sub>
+                        <m:r>
+                          <a:rPr lang="en-US" altLang="ko-KR" sz="2200" b="0" i="1" smtClean="0">
+                            <a:latin typeface="Cambria Math" panose="02040503050406030204" pitchFamily="18" charset="0"/>
+                          </a:rPr>
+                          <m:t>1</m:t>
+                        </m:r>
+                      </m:sub>
+                    </m:sSub>
+                    <m:r>
+                      <a:rPr lang="en-US" altLang="ko-KR" sz="2200" b="0" i="1" smtClean="0">
+                        <a:latin typeface="Cambria Math" panose="02040503050406030204" pitchFamily="18" charset="0"/>
+                      </a:rPr>
+                      <m:t>−0.5</m:t>
+                    </m:r>
+                    <m:sSub>
+                      <m:sSubPr>
+                        <m:ctrlPr>
+                          <a:rPr lang="en-US" altLang="ko-KR" sz="2200" b="0" i="1" smtClean="0">
+                            <a:latin typeface="Cambria Math" panose="02040503050406030204" pitchFamily="18" charset="0"/>
+                          </a:rPr>
+                        </m:ctrlPr>
+                      </m:sSubPr>
+                      <m:e>
+                        <m:r>
+                          <a:rPr lang="en-US" altLang="ko-KR" sz="2200" b="0" i="1" smtClean="0">
+                            <a:latin typeface="Cambria Math" panose="02040503050406030204" pitchFamily="18" charset="0"/>
+                          </a:rPr>
+                          <m:t>𝑥</m:t>
+                        </m:r>
+                      </m:e>
+                      <m:sub>
+                        <m:r>
+                          <a:rPr lang="en-US" altLang="ko-KR" sz="2200" b="0" i="1" smtClean="0">
+                            <a:latin typeface="Cambria Math" panose="02040503050406030204" pitchFamily="18" charset="0"/>
+                          </a:rPr>
+                          <m:t>2</m:t>
+                        </m:r>
+                      </m:sub>
+                    </m:sSub>
+                    <m:r>
+                      <a:rPr lang="en-US" altLang="ko-KR" sz="2200" b="0" i="1" smtClean="0">
+                        <a:latin typeface="Cambria Math" panose="02040503050406030204" pitchFamily="18" charset="0"/>
+                      </a:rPr>
+                      <m:t>+0.7</m:t>
+                    </m:r>
+                  </m:oMath>
+                </a14:m>
+                <a:endParaRPr lang="en-US" altLang="ko-KR" sz="2200" dirty="0" smtClean="0"/>
+              </a:p>
+              <a:p>
+                <a:pPr lvl="1"/>
+                <a14:m>
+                  <m:oMath xmlns:m="http://schemas.openxmlformats.org/officeDocument/2006/math">
+                    <m:r>
+                      <a:rPr lang="en-US" altLang="ko-KR" sz="2200" b="0" i="1" smtClean="0">
+                        <a:latin typeface="Cambria Math" panose="02040503050406030204" pitchFamily="18" charset="0"/>
+                      </a:rPr>
+                      <m:t>𝐴𝑁𝐷</m:t>
+                    </m:r>
+                    <m:r>
+                      <a:rPr lang="en-US" altLang="ko-KR" sz="2200" b="0" i="1" smtClean="0">
+                        <a:latin typeface="Cambria Math" panose="02040503050406030204" pitchFamily="18" charset="0"/>
+                      </a:rPr>
+                      <m:t>(</m:t>
+                    </m:r>
+                    <m:sSub>
+                      <m:sSubPr>
+                        <m:ctrlPr>
+                          <a:rPr lang="en-US" altLang="ko-KR" sz="2200" i="1">
+                            <a:latin typeface="Cambria Math" panose="02040503050406030204" pitchFamily="18" charset="0"/>
+                          </a:rPr>
+                        </m:ctrlPr>
+                      </m:sSubPr>
+                      <m:e>
+                        <m:r>
+                          <a:rPr lang="en-US" altLang="ko-KR" sz="2200" i="1">
+                            <a:latin typeface="Cambria Math" panose="02040503050406030204" pitchFamily="18" charset="0"/>
+                          </a:rPr>
+                          <m:t>𝑥</m:t>
+                        </m:r>
+                      </m:e>
+                      <m:sub>
+                        <m:r>
+                          <a:rPr lang="en-US" altLang="ko-KR" sz="2200" i="1">
+                            <a:latin typeface="Cambria Math" panose="02040503050406030204" pitchFamily="18" charset="0"/>
+                          </a:rPr>
+                          <m:t>1</m:t>
+                        </m:r>
+                      </m:sub>
+                    </m:sSub>
+                    <m:r>
+                      <a:rPr lang="en-US" altLang="ko-KR" sz="2200" b="0" i="1" smtClean="0">
+                        <a:latin typeface="Cambria Math" panose="02040503050406030204" pitchFamily="18" charset="0"/>
+                      </a:rPr>
+                      <m:t>,</m:t>
+                    </m:r>
+                    <m:sSub>
+                      <m:sSubPr>
+                        <m:ctrlPr>
+                          <a:rPr lang="en-US" altLang="ko-KR" sz="2200" i="1">
+                            <a:latin typeface="Cambria Math" panose="02040503050406030204" pitchFamily="18" charset="0"/>
+                          </a:rPr>
+                        </m:ctrlPr>
+                      </m:sSubPr>
+                      <m:e>
+                        <m:r>
+                          <a:rPr lang="en-US" altLang="ko-KR" sz="2200" i="1">
+                            <a:latin typeface="Cambria Math" panose="02040503050406030204" pitchFamily="18" charset="0"/>
+                          </a:rPr>
+                          <m:t>𝑥</m:t>
+                        </m:r>
+                      </m:e>
+                      <m:sub>
+                        <m:r>
+                          <a:rPr lang="en-US" altLang="ko-KR" sz="2200" i="1">
+                            <a:latin typeface="Cambria Math" panose="02040503050406030204" pitchFamily="18" charset="0"/>
+                          </a:rPr>
+                          <m:t>2</m:t>
+                        </m:r>
+                      </m:sub>
+                    </m:sSub>
+                    <m:r>
+                      <a:rPr lang="en-US" altLang="ko-KR" sz="2200" b="0" i="1" smtClean="0">
+                        <a:latin typeface="Cambria Math" panose="02040503050406030204" pitchFamily="18" charset="0"/>
+                      </a:rPr>
+                      <m:t>)=</m:t>
+                    </m:r>
+                    <m:d>
+                      <m:dPr>
+                        <m:begChr m:val="{"/>
+                        <m:endChr m:val=""/>
+                        <m:ctrlPr>
+                          <a:rPr lang="en-US" altLang="ko-KR" sz="2200" b="0" i="1" smtClean="0">
+                            <a:latin typeface="Cambria Math" panose="02040503050406030204" pitchFamily="18" charset="0"/>
+                          </a:rPr>
+                        </m:ctrlPr>
+                      </m:dPr>
+                      <m:e>
+                        <m:eqArr>
+                          <m:eqArrPr>
+                            <m:ctrlPr>
+                              <a:rPr lang="en-US" altLang="ko-KR" sz="2200" b="0" i="1" smtClean="0">
+                                <a:latin typeface="Cambria Math" panose="02040503050406030204" pitchFamily="18" charset="0"/>
+                              </a:rPr>
+                            </m:ctrlPr>
+                          </m:eqArrPr>
+                          <m:e>
+                            <m:r>
+                              <a:rPr lang="en-US" altLang="ko-KR" sz="2200" b="0" i="1" smtClean="0">
+                                <a:latin typeface="Cambria Math" panose="02040503050406030204" pitchFamily="18" charset="0"/>
+                              </a:rPr>
+                              <m:t>0</m:t>
+                            </m:r>
+                            <m:r>
+                              <a:rPr lang="en-US" altLang="ko-KR" sz="2200" b="0" i="1" smtClean="0">
+                                <a:latin typeface="Cambria Math" panose="02040503050406030204" pitchFamily="18" charset="0"/>
+                              </a:rPr>
+                              <m:t>,  </m:t>
+                            </m:r>
+                            <m:r>
+                              <a:rPr lang="en-US" altLang="ko-KR" sz="2200" i="1">
+                                <a:latin typeface="Cambria Math" panose="02040503050406030204" pitchFamily="18" charset="0"/>
+                              </a:rPr>
+                              <m:t>𝑦</m:t>
+                            </m:r>
+                            <m:r>
+                              <a:rPr lang="en-US" altLang="ko-KR" sz="2200" b="0" i="1" smtClean="0">
+                                <a:latin typeface="Cambria Math" panose="02040503050406030204" pitchFamily="18" charset="0"/>
+                              </a:rPr>
+                              <m:t>≤0</m:t>
+                            </m:r>
+                          </m:e>
+                          <m:e>
+                            <m:r>
+                              <a:rPr lang="en-US" altLang="ko-KR" sz="2200" b="0" i="1" smtClean="0">
+                                <a:latin typeface="Cambria Math" panose="02040503050406030204" pitchFamily="18" charset="0"/>
+                              </a:rPr>
+                              <m:t>&amp;1,  </m:t>
+                            </m:r>
+                            <m:r>
+                              <a:rPr lang="en-US" altLang="ko-KR" sz="2200" i="1">
+                                <a:latin typeface="Cambria Math" panose="02040503050406030204" pitchFamily="18" charset="0"/>
+                              </a:rPr>
+                              <m:t>𝑦</m:t>
+                            </m:r>
+                            <m:r>
+                              <a:rPr lang="en-US" altLang="ko-KR" sz="2200" b="0" i="1" smtClean="0">
+                                <a:latin typeface="Cambria Math" panose="02040503050406030204" pitchFamily="18" charset="0"/>
+                              </a:rPr>
+                              <m:t>&gt;0</m:t>
+                            </m:r>
+                          </m:e>
+                        </m:eqArr>
+                      </m:e>
+                    </m:d>
+                  </m:oMath>
+                </a14:m>
+                <a:endParaRPr lang="en-US" altLang="ko-KR" sz="2200" dirty="0"/>
+              </a:p>
+            </p:txBody>
+          </p:sp>
+        </mc:Choice>
+        <mc:Fallback>
+          <p:sp>
+            <p:nvSpPr>
+              <p:cNvPr id="6" name="내용 개체 틀 3"/>
+              <p:cNvSpPr>
+                <a:spLocks noGrp="1" noRot="1" noChangeAspect="1" noMove="1" noResize="1" noEditPoints="1" noAdjustHandles="1" noChangeArrowheads="1" noChangeShapeType="1" noTextEdit="1"/>
+              </p:cNvSpPr>
+              <p:nvPr>
+                <p:ph idx="1"/>
+              </p:nvPr>
+            </p:nvSpPr>
+            <p:spPr>
+              <a:xfrm>
+                <a:off x="838200" y="1825625"/>
+                <a:ext cx="10429356" cy="4351338"/>
+              </a:xfrm>
+              <a:blipFill rotWithShape="0">
+                <a:blip r:embed="rId2"/>
+                <a:stretch>
+                  <a:fillRect l="-643"/>
+                </a:stretch>
+              </a:blipFill>
+            </p:spPr>
+            <p:txBody>
+              <a:bodyPr/>
+              <a:lstStyle/>
+              <a:p>
+                <a:r>
+                  <a:rPr lang="ko-KR" altLang="en-US">
+                    <a:noFill/>
+                  </a:rPr>
+                  <a:t> </a:t>
+                </a:r>
+              </a:p>
+            </p:txBody>
+          </p:sp>
+        </mc:Fallback>
+      </mc:AlternateContent>
+      <p:pic>
+        <p:nvPicPr>
+          <p:cNvPr id="4" name="그림 3"/>
+          <p:cNvPicPr>
+            <a:picLocks noChangeAspect="1"/>
+          </p:cNvPicPr>
+          <p:nvPr/>
+        </p:nvPicPr>
+        <p:blipFill rotWithShape="1">
+          <a:blip r:embed="rId3"/>
+          <a:srcRect l="21117" t="14660" r="57334" b="34096"/>
+          <a:stretch/>
+        </p:blipFill>
+        <p:spPr>
+          <a:xfrm>
+            <a:off x="7611291" y="1564368"/>
+            <a:ext cx="3656265" cy="5118770"/>
+          </a:xfrm>
+          <a:prstGeom prst="rect">
+            <a:avLst/>
+          </a:prstGeom>
+        </p:spPr>
+      </p:pic>
+    </p:spTree>
+    <p:extLst>
+      <p:ext uri="{BB962C8B-B14F-4D97-AF65-F5344CB8AC3E}">
+        <p14:creationId xmlns:p14="http://schemas.microsoft.com/office/powerpoint/2010/main" val="3714139810"/>
+      </p:ext>
+    </p:extLst>
+  </p:cSld>
+  <p:clrMapOvr>
+    <a:masterClrMapping/>
+  </p:clrMapOvr>
+  <p:timing>
+    <p:tnLst>
+      <p:par>
+        <p:cTn id="1" dur="indefinite" restart="never" nodeType="tmRoot"/>
+      </p:par>
+    </p:tnLst>
+  </p:timing>
+</p:sld>
+</file>
+
+<file path=ppt/slides/slide12.xml><?xml version="1.0" encoding="utf-8"?>
+<p:sld xmlns:a="http://schemas.openxmlformats.org/drawingml/2006/main" xmlns:r="http://schemas.openxmlformats.org/officeDocument/2006/relationships" xmlns:p="http://schemas.openxmlformats.org/presentationml/2006/main">
+  <p:cSld>
+    <p:spTree>
+      <p:nvGrpSpPr>
+        <p:cNvPr id="1" name=""/>
+        <p:cNvGrpSpPr/>
+        <p:nvPr/>
+      </p:nvGrpSpPr>
+      <p:grpSpPr>
+        <a:xfrm>
+          <a:off x="0" y="0"/>
+          <a:ext cx="0" cy="0"/>
+          <a:chOff x="0" y="0"/>
+          <a:chExt cx="0" cy="0"/>
+        </a:xfrm>
+      </p:grpSpPr>
+      <p:sp>
+        <p:nvSpPr>
+          <p:cNvPr id="2" name="제목 1"/>
+          <p:cNvSpPr>
+            <a:spLocks noGrp="1"/>
+          </p:cNvSpPr>
+          <p:nvPr>
+            <p:ph type="title"/>
+          </p:nvPr>
+        </p:nvSpPr>
+        <p:spPr/>
+        <p:txBody>
+          <a:bodyPr/>
+          <a:lstStyle/>
+          <a:p>
+            <a:r>
+              <a:rPr lang="en-US" altLang="ko-KR" dirty="0" smtClean="0"/>
+              <a:t>Example 1) and, or, </a:t>
+            </a:r>
+            <a:r>
+              <a:rPr lang="en-US" altLang="ko-KR" dirty="0" err="1" smtClean="0"/>
+              <a:t>nand</a:t>
+            </a:r>
+            <a:r>
+              <a:rPr lang="en-US" altLang="ko-KR" dirty="0" smtClean="0"/>
+              <a:t>, </a:t>
+            </a:r>
+            <a:r>
+              <a:rPr lang="en-US" altLang="ko-KR" dirty="0" err="1" smtClean="0"/>
+              <a:t>xor</a:t>
+            </a:r>
+            <a:endParaRPr lang="en-US" altLang="ko-KR" dirty="0"/>
+          </a:p>
+        </p:txBody>
+      </p:sp>
+      <mc:AlternateContent xmlns:mc="http://schemas.openxmlformats.org/markup-compatibility/2006">
+        <mc:Choice xmlns:a14="http://schemas.microsoft.com/office/drawing/2010/main" Requires="a14">
+          <p:sp>
+            <p:nvSpPr>
+              <p:cNvPr id="6" name="내용 개체 틀 3"/>
+              <p:cNvSpPr>
+                <a:spLocks noGrp="1"/>
+              </p:cNvSpPr>
+              <p:nvPr>
+                <p:ph idx="1"/>
+              </p:nvPr>
+            </p:nvSpPr>
+            <p:spPr>
+              <a:xfrm>
+                <a:off x="838200" y="1825625"/>
+                <a:ext cx="10429356" cy="4351338"/>
+              </a:xfrm>
+            </p:spPr>
+            <p:txBody>
+              <a:bodyPr>
+                <a:normAutofit/>
+              </a:bodyPr>
+              <a:lstStyle/>
+              <a:p>
+                <a:r>
+                  <a:rPr lang="en-US" altLang="ko-KR" dirty="0" smtClean="0"/>
+                  <a:t>AND</a:t>
+                </a:r>
+              </a:p>
+              <a:p>
+                <a:pPr lvl="1"/>
+                <a14:m>
+                  <m:oMath xmlns:m="http://schemas.openxmlformats.org/officeDocument/2006/math">
+                    <m:r>
+                      <a:rPr lang="en-US" altLang="ko-KR" sz="2200" b="0" i="1" smtClean="0">
+                        <a:latin typeface="Cambria Math" panose="02040503050406030204" pitchFamily="18" charset="0"/>
+                      </a:rPr>
+                      <m:t>𝑦</m:t>
+                    </m:r>
+                    <m:r>
+                      <a:rPr lang="en-US" altLang="ko-KR" sz="2200" b="0" i="1" smtClean="0">
+                        <a:latin typeface="Cambria Math" panose="02040503050406030204" pitchFamily="18" charset="0"/>
+                      </a:rPr>
+                      <m:t>=0.5</m:t>
+                    </m:r>
+                    <m:sSub>
+                      <m:sSubPr>
+                        <m:ctrlPr>
+                          <a:rPr lang="en-US" altLang="ko-KR" sz="2200" b="0" i="1" smtClean="0">
+                            <a:latin typeface="Cambria Math" panose="02040503050406030204" pitchFamily="18" charset="0"/>
+                          </a:rPr>
+                        </m:ctrlPr>
+                      </m:sSubPr>
+                      <m:e>
+                        <m:r>
+                          <a:rPr lang="en-US" altLang="ko-KR" sz="2200" b="0" i="1" smtClean="0">
+                            <a:latin typeface="Cambria Math" panose="02040503050406030204" pitchFamily="18" charset="0"/>
+                          </a:rPr>
+                          <m:t>𝑥</m:t>
+                        </m:r>
+                      </m:e>
+                      <m:sub>
+                        <m:r>
+                          <a:rPr lang="en-US" altLang="ko-KR" sz="2200" b="0" i="1" smtClean="0">
+                            <a:latin typeface="Cambria Math" panose="02040503050406030204" pitchFamily="18" charset="0"/>
+                          </a:rPr>
+                          <m:t>1</m:t>
+                        </m:r>
+                      </m:sub>
+                    </m:sSub>
+                    <m:r>
+                      <a:rPr lang="en-US" altLang="ko-KR" sz="2200" b="0" i="1" smtClean="0">
+                        <a:latin typeface="Cambria Math" panose="02040503050406030204" pitchFamily="18" charset="0"/>
+                      </a:rPr>
+                      <m:t>+0.5</m:t>
+                    </m:r>
+                    <m:sSub>
+                      <m:sSubPr>
+                        <m:ctrlPr>
+                          <a:rPr lang="en-US" altLang="ko-KR" sz="2200" b="0" i="1" smtClean="0">
+                            <a:latin typeface="Cambria Math" panose="02040503050406030204" pitchFamily="18" charset="0"/>
+                          </a:rPr>
+                        </m:ctrlPr>
+                      </m:sSubPr>
+                      <m:e>
+                        <m:r>
+                          <a:rPr lang="en-US" altLang="ko-KR" sz="2200" b="0" i="1" smtClean="0">
+                            <a:latin typeface="Cambria Math" panose="02040503050406030204" pitchFamily="18" charset="0"/>
+                          </a:rPr>
+                          <m:t>𝑥</m:t>
+                        </m:r>
+                      </m:e>
+                      <m:sub>
+                        <m:r>
+                          <a:rPr lang="en-US" altLang="ko-KR" sz="2200" b="0" i="1" smtClean="0">
+                            <a:latin typeface="Cambria Math" panose="02040503050406030204" pitchFamily="18" charset="0"/>
+                          </a:rPr>
+                          <m:t>2</m:t>
+                        </m:r>
+                      </m:sub>
+                    </m:sSub>
+                    <m:r>
+                      <a:rPr lang="en-US" altLang="ko-KR" sz="2200" b="0" i="1" smtClean="0">
+                        <a:latin typeface="Cambria Math" panose="02040503050406030204" pitchFamily="18" charset="0"/>
+                      </a:rPr>
+                      <m:t>−0.7</m:t>
+                    </m:r>
+                  </m:oMath>
+                </a14:m>
+                <a:endParaRPr lang="en-US" altLang="ko-KR" sz="2200" dirty="0" smtClean="0"/>
+              </a:p>
+              <a:p>
+                <a:pPr lvl="1"/>
+                <a14:m>
+                  <m:oMath xmlns:m="http://schemas.openxmlformats.org/officeDocument/2006/math">
+                    <m:r>
+                      <a:rPr lang="en-US" altLang="ko-KR" sz="2200" b="0" i="1" smtClean="0">
+                        <a:latin typeface="Cambria Math" panose="02040503050406030204" pitchFamily="18" charset="0"/>
+                      </a:rPr>
+                      <m:t>𝐴𝑁𝐷</m:t>
+                    </m:r>
+                    <m:r>
+                      <a:rPr lang="en-US" altLang="ko-KR" sz="2200" b="0" i="1" smtClean="0">
+                        <a:latin typeface="Cambria Math" panose="02040503050406030204" pitchFamily="18" charset="0"/>
+                      </a:rPr>
+                      <m:t>(</m:t>
+                    </m:r>
+                    <m:sSub>
+                      <m:sSubPr>
+                        <m:ctrlPr>
+                          <a:rPr lang="en-US" altLang="ko-KR" sz="2200" i="1">
+                            <a:latin typeface="Cambria Math" panose="02040503050406030204" pitchFamily="18" charset="0"/>
+                          </a:rPr>
+                        </m:ctrlPr>
+                      </m:sSubPr>
+                      <m:e>
+                        <m:r>
+                          <a:rPr lang="en-US" altLang="ko-KR" sz="2200" i="1">
+                            <a:latin typeface="Cambria Math" panose="02040503050406030204" pitchFamily="18" charset="0"/>
+                          </a:rPr>
+                          <m:t>𝑥</m:t>
+                        </m:r>
+                      </m:e>
+                      <m:sub>
+                        <m:r>
+                          <a:rPr lang="en-US" altLang="ko-KR" sz="2200" i="1">
+                            <a:latin typeface="Cambria Math" panose="02040503050406030204" pitchFamily="18" charset="0"/>
+                          </a:rPr>
+                          <m:t>1</m:t>
+                        </m:r>
+                      </m:sub>
+                    </m:sSub>
+                    <m:r>
+                      <a:rPr lang="en-US" altLang="ko-KR" sz="2200" b="0" i="1" smtClean="0">
+                        <a:latin typeface="Cambria Math" panose="02040503050406030204" pitchFamily="18" charset="0"/>
+                      </a:rPr>
+                      <m:t>,</m:t>
+                    </m:r>
+                    <m:sSub>
+                      <m:sSubPr>
+                        <m:ctrlPr>
+                          <a:rPr lang="en-US" altLang="ko-KR" sz="2200" i="1">
+                            <a:latin typeface="Cambria Math" panose="02040503050406030204" pitchFamily="18" charset="0"/>
+                          </a:rPr>
+                        </m:ctrlPr>
+                      </m:sSubPr>
+                      <m:e>
+                        <m:r>
+                          <a:rPr lang="en-US" altLang="ko-KR" sz="2200" i="1">
+                            <a:latin typeface="Cambria Math" panose="02040503050406030204" pitchFamily="18" charset="0"/>
+                          </a:rPr>
+                          <m:t>𝑥</m:t>
+                        </m:r>
+                      </m:e>
+                      <m:sub>
+                        <m:r>
+                          <a:rPr lang="en-US" altLang="ko-KR" sz="2200" i="1">
+                            <a:latin typeface="Cambria Math" panose="02040503050406030204" pitchFamily="18" charset="0"/>
+                          </a:rPr>
+                          <m:t>2</m:t>
+                        </m:r>
+                      </m:sub>
+                    </m:sSub>
+                    <m:r>
+                      <a:rPr lang="en-US" altLang="ko-KR" sz="2200" b="0" i="1" smtClean="0">
+                        <a:latin typeface="Cambria Math" panose="02040503050406030204" pitchFamily="18" charset="0"/>
+                      </a:rPr>
+                      <m:t>)=</m:t>
+                    </m:r>
+                    <m:d>
+                      <m:dPr>
+                        <m:begChr m:val="{"/>
+                        <m:endChr m:val=""/>
+                        <m:ctrlPr>
+                          <a:rPr lang="en-US" altLang="ko-KR" sz="2200" b="0" i="1" smtClean="0">
+                            <a:latin typeface="Cambria Math" panose="02040503050406030204" pitchFamily="18" charset="0"/>
+                          </a:rPr>
+                        </m:ctrlPr>
+                      </m:dPr>
+                      <m:e>
+                        <m:eqArr>
+                          <m:eqArrPr>
+                            <m:ctrlPr>
+                              <a:rPr lang="en-US" altLang="ko-KR" sz="2200" b="0" i="1" smtClean="0">
+                                <a:latin typeface="Cambria Math" panose="02040503050406030204" pitchFamily="18" charset="0"/>
+                              </a:rPr>
+                            </m:ctrlPr>
+                          </m:eqArrPr>
+                          <m:e>
+                            <m:r>
+                              <a:rPr lang="en-US" altLang="ko-KR" sz="2200" b="0" i="1" smtClean="0">
+                                <a:latin typeface="Cambria Math" panose="02040503050406030204" pitchFamily="18" charset="0"/>
+                              </a:rPr>
+                              <m:t>0</m:t>
+                            </m:r>
+                            <m:r>
+                              <a:rPr lang="en-US" altLang="ko-KR" sz="2200" b="0" i="1" smtClean="0">
+                                <a:latin typeface="Cambria Math" panose="02040503050406030204" pitchFamily="18" charset="0"/>
+                              </a:rPr>
+                              <m:t>,  </m:t>
+                            </m:r>
+                            <m:r>
+                              <a:rPr lang="en-US" altLang="ko-KR" sz="2200" i="1">
+                                <a:latin typeface="Cambria Math" panose="02040503050406030204" pitchFamily="18" charset="0"/>
+                              </a:rPr>
+                              <m:t>𝑦</m:t>
+                            </m:r>
+                            <m:r>
+                              <a:rPr lang="en-US" altLang="ko-KR" sz="2200" b="0" i="1" smtClean="0">
+                                <a:latin typeface="Cambria Math" panose="02040503050406030204" pitchFamily="18" charset="0"/>
+                              </a:rPr>
+                              <m:t>≤0</m:t>
+                            </m:r>
+                          </m:e>
+                          <m:e>
+                            <m:r>
+                              <a:rPr lang="en-US" altLang="ko-KR" sz="2200" b="0" i="1" smtClean="0">
+                                <a:latin typeface="Cambria Math" panose="02040503050406030204" pitchFamily="18" charset="0"/>
+                              </a:rPr>
+                              <m:t>&amp;1,  </m:t>
+                            </m:r>
+                            <m:r>
+                              <a:rPr lang="en-US" altLang="ko-KR" sz="2200" i="1">
+                                <a:latin typeface="Cambria Math" panose="02040503050406030204" pitchFamily="18" charset="0"/>
+                              </a:rPr>
+                              <m:t>𝑦</m:t>
+                            </m:r>
+                            <m:r>
+                              <a:rPr lang="en-US" altLang="ko-KR" sz="2200" b="0" i="1" smtClean="0">
+                                <a:latin typeface="Cambria Math" panose="02040503050406030204" pitchFamily="18" charset="0"/>
+                              </a:rPr>
+                              <m:t>&gt;0</m:t>
+                            </m:r>
+                          </m:e>
+                        </m:eqArr>
+                      </m:e>
+                    </m:d>
+                  </m:oMath>
+                </a14:m>
+                <a:endParaRPr lang="en-US" altLang="ko-KR" sz="2200" dirty="0"/>
+              </a:p>
+            </p:txBody>
+          </p:sp>
+        </mc:Choice>
+        <mc:Fallback>
+          <p:sp>
+            <p:nvSpPr>
+              <p:cNvPr id="6" name="내용 개체 틀 3"/>
+              <p:cNvSpPr>
+                <a:spLocks noGrp="1" noRot="1" noChangeAspect="1" noMove="1" noResize="1" noEditPoints="1" noAdjustHandles="1" noChangeArrowheads="1" noChangeShapeType="1" noTextEdit="1"/>
+              </p:cNvSpPr>
+              <p:nvPr>
+                <p:ph idx="1"/>
+              </p:nvPr>
+            </p:nvSpPr>
+            <p:spPr>
+              <a:xfrm>
+                <a:off x="838200" y="1825625"/>
+                <a:ext cx="10429356" cy="4351338"/>
+              </a:xfrm>
+              <a:blipFill rotWithShape="0">
+                <a:blip r:embed="rId2"/>
+                <a:stretch>
+                  <a:fillRect l="-643"/>
+                </a:stretch>
+              </a:blipFill>
+            </p:spPr>
+            <p:txBody>
+              <a:bodyPr/>
+              <a:lstStyle/>
+              <a:p>
+                <a:r>
+                  <a:rPr lang="ko-KR" altLang="en-US">
+                    <a:noFill/>
+                  </a:rPr>
+                  <a:t> </a:t>
+                </a:r>
+              </a:p>
+            </p:txBody>
+          </p:sp>
+        </mc:Fallback>
+      </mc:AlternateContent>
+      <p:pic>
+        <p:nvPicPr>
+          <p:cNvPr id="4" name="그림 3"/>
+          <p:cNvPicPr>
+            <a:picLocks noChangeAspect="1"/>
+          </p:cNvPicPr>
+          <p:nvPr/>
+        </p:nvPicPr>
+        <p:blipFill rotWithShape="1">
+          <a:blip r:embed="rId3"/>
+          <a:srcRect l="21117" t="14660" r="57334" b="34096"/>
+          <a:stretch/>
+        </p:blipFill>
+        <p:spPr>
+          <a:xfrm>
+            <a:off x="7611291" y="1564368"/>
+            <a:ext cx="3656265" cy="5118770"/>
+          </a:xfrm>
+          <a:prstGeom prst="rect">
+            <a:avLst/>
+          </a:prstGeom>
+        </p:spPr>
+      </p:pic>
+    </p:spTree>
+    <p:extLst>
+      <p:ext uri="{BB962C8B-B14F-4D97-AF65-F5344CB8AC3E}">
+        <p14:creationId xmlns:p14="http://schemas.microsoft.com/office/powerpoint/2010/main" val="218025715"/>
+      </p:ext>
+    </p:extLst>
+  </p:cSld>
+  <p:clrMapOvr>
+    <a:masterClrMapping/>
+  </p:clrMapOvr>
+  <p:timing>
+    <p:tnLst>
+      <p:par>
+        <p:cTn id="1" dur="indefinite" restart="never" nodeType="tmRoot"/>
+      </p:par>
+    </p:tnLst>
+  </p:timing>
+</p:sld>
+</file>
+
+<file path=ppt/slides/slide13.xml><?xml version="1.0" encoding="utf-8"?>
+<p:sld xmlns:a="http://schemas.openxmlformats.org/drawingml/2006/main" xmlns:r="http://schemas.openxmlformats.org/officeDocument/2006/relationships" xmlns:p="http://schemas.openxmlformats.org/presentationml/2006/main">
+  <p:cSld>
+    <p:spTree>
+      <p:nvGrpSpPr>
+        <p:cNvPr id="1" name=""/>
+        <p:cNvGrpSpPr/>
+        <p:nvPr/>
+      </p:nvGrpSpPr>
+      <p:grpSpPr>
+        <a:xfrm>
+          <a:off x="0" y="0"/>
+          <a:ext cx="0" cy="0"/>
+          <a:chOff x="0" y="0"/>
+          <a:chExt cx="0" cy="0"/>
+        </a:xfrm>
+      </p:grpSpPr>
+      <p:sp>
+        <p:nvSpPr>
+          <p:cNvPr id="2" name="제목 1"/>
+          <p:cNvSpPr>
+            <a:spLocks noGrp="1"/>
+          </p:cNvSpPr>
+          <p:nvPr>
+            <p:ph type="title"/>
+          </p:nvPr>
+        </p:nvSpPr>
+        <p:spPr/>
+        <p:txBody>
+          <a:bodyPr/>
+          <a:lstStyle/>
+          <a:p>
+            <a:r>
               <a:rPr lang="ko-KR" altLang="en-US" dirty="0" smtClean="0"/>
-              <a:t>참고영상</a:t>
+              <a:t>참고문헌</a:t>
             </a:r>
             <a:endParaRPr lang="ko-KR" altLang="en-US" dirty="0"/>
           </a:p>
@@ -6013,6 +6932,446 @@
             </a:lvl9pPr>
           </a:lstStyle>
           <a:p>
+            <a:pPr marL="457200" indent="-457200">
+              <a:buFont typeface="+mj-lt"/>
+              <a:buAutoNum type="arabicPeriod"/>
+            </a:pPr>
+            <a:r>
+              <a:rPr lang="ko-KR" altLang="en-US" dirty="0" err="1" smtClean="0"/>
+              <a:t>사이토</a:t>
+            </a:r>
+            <a:r>
+              <a:rPr lang="ko-KR" altLang="en-US" dirty="0" smtClean="0"/>
+              <a:t> </a:t>
+            </a:r>
+            <a:r>
+              <a:rPr lang="ko-KR" altLang="en-US" dirty="0" err="1" smtClean="0"/>
+              <a:t>고키</a:t>
+            </a:r>
+            <a:r>
+              <a:rPr lang="en-US" altLang="ko-KR" dirty="0" smtClean="0"/>
+              <a:t>, “</a:t>
+            </a:r>
+            <a:r>
+              <a:rPr lang="ko-KR" altLang="en-US" dirty="0" smtClean="0"/>
+              <a:t>밑바닥부터 시작하는 </a:t>
+            </a:r>
+            <a:r>
+              <a:rPr lang="ko-KR" altLang="en-US" dirty="0" err="1" smtClean="0"/>
+              <a:t>딥러닝</a:t>
+            </a:r>
+            <a:r>
+              <a:rPr lang="en-US" altLang="ko-KR" dirty="0" smtClean="0"/>
+              <a:t>”, </a:t>
+            </a:r>
+            <a:r>
+              <a:rPr lang="ko-KR" altLang="en-US" dirty="0" err="1" smtClean="0"/>
+              <a:t>오레일리</a:t>
+            </a:r>
+            <a:r>
+              <a:rPr lang="en-US" altLang="ko-KR" dirty="0" smtClean="0"/>
+              <a:t>, 2016.</a:t>
+            </a:r>
+          </a:p>
+          <a:p>
+            <a:pPr marL="0" indent="0">
+              <a:buNone/>
+            </a:pPr>
+            <a:r>
+              <a:rPr lang="en-US" altLang="ko-KR" dirty="0" smtClean="0"/>
+              <a:t>        (</a:t>
+            </a:r>
+            <a:r>
+              <a:rPr lang="ko-KR" altLang="en-US" dirty="0" smtClean="0"/>
+              <a:t>역</a:t>
+            </a:r>
+            <a:r>
+              <a:rPr lang="en-US" altLang="ko-KR" dirty="0" smtClean="0"/>
+              <a:t>: </a:t>
+            </a:r>
+            <a:r>
+              <a:rPr lang="ko-KR" altLang="en-US" dirty="0" err="1" smtClean="0"/>
+              <a:t>개앞맵시</a:t>
+            </a:r>
+            <a:r>
+              <a:rPr lang="en-US" altLang="ko-KR" dirty="0" smtClean="0"/>
+              <a:t>, </a:t>
+            </a:r>
+            <a:r>
+              <a:rPr lang="ko-KR" altLang="en-US" dirty="0" smtClean="0"/>
+              <a:t>번역 출판</a:t>
+            </a:r>
+            <a:r>
+              <a:rPr lang="en-US" altLang="ko-KR" dirty="0" smtClean="0"/>
+              <a:t>: </a:t>
+            </a:r>
+            <a:r>
+              <a:rPr lang="ko-KR" altLang="en-US" dirty="0" err="1" smtClean="0"/>
+              <a:t>한빛미디어</a:t>
+            </a:r>
+            <a:r>
+              <a:rPr lang="en-US" altLang="ko-KR" dirty="0" smtClean="0"/>
+              <a:t>)</a:t>
+            </a:r>
+          </a:p>
+          <a:p>
+            <a:pPr marL="457200" indent="-457200">
+              <a:buFont typeface="+mj-lt"/>
+              <a:buAutoNum type="arabicPeriod" startAt="2"/>
+            </a:pPr>
+            <a:endParaRPr lang="en-US" altLang="ko-KR" dirty="0" smtClean="0"/>
+          </a:p>
+          <a:p>
+            <a:pPr marL="457200" indent="-457200">
+              <a:buFont typeface="+mj-lt"/>
+              <a:buAutoNum type="arabicPeriod" startAt="2"/>
+            </a:pPr>
+            <a:endParaRPr lang="en-US" altLang="ko-KR" dirty="0" smtClean="0"/>
+          </a:p>
+          <a:p>
+            <a:endParaRPr lang="en-US" altLang="ko-KR" dirty="0" smtClean="0"/>
+          </a:p>
+          <a:p>
+            <a:endParaRPr lang="en-US" altLang="ko-KR" dirty="0" smtClean="0"/>
+          </a:p>
+        </p:txBody>
+      </p:sp>
+    </p:spTree>
+    <p:extLst>
+      <p:ext uri="{BB962C8B-B14F-4D97-AF65-F5344CB8AC3E}">
+        <p14:creationId xmlns:p14="http://schemas.microsoft.com/office/powerpoint/2010/main" val="3102446479"/>
+      </p:ext>
+    </p:extLst>
+  </p:cSld>
+  <p:clrMapOvr>
+    <a:masterClrMapping/>
+  </p:clrMapOvr>
+  <p:timing>
+    <p:tnLst>
+      <p:par>
+        <p:cTn id="1" dur="indefinite" restart="never" nodeType="tmRoot"/>
+      </p:par>
+    </p:tnLst>
+  </p:timing>
+</p:sld>
+</file>
+
+<file path=ppt/slides/slide14.xml><?xml version="1.0" encoding="utf-8"?>
+<p:sld xmlns:a="http://schemas.openxmlformats.org/drawingml/2006/main" xmlns:r="http://schemas.openxmlformats.org/officeDocument/2006/relationships" xmlns:p="http://schemas.openxmlformats.org/presentationml/2006/main">
+  <p:cSld>
+    <p:spTree>
+      <p:nvGrpSpPr>
+        <p:cNvPr id="1" name=""/>
+        <p:cNvGrpSpPr/>
+        <p:nvPr/>
+      </p:nvGrpSpPr>
+      <p:grpSpPr>
+        <a:xfrm>
+          <a:off x="0" y="0"/>
+          <a:ext cx="0" cy="0"/>
+          <a:chOff x="0" y="0"/>
+          <a:chExt cx="0" cy="0"/>
+        </a:xfrm>
+      </p:grpSpPr>
+      <p:sp>
+        <p:nvSpPr>
+          <p:cNvPr id="2" name="제목 1"/>
+          <p:cNvSpPr>
+            <a:spLocks noGrp="1"/>
+          </p:cNvSpPr>
+          <p:nvPr>
+            <p:ph type="title"/>
+          </p:nvPr>
+        </p:nvSpPr>
+        <p:spPr/>
+        <p:txBody>
+          <a:bodyPr/>
+          <a:lstStyle/>
+          <a:p>
+            <a:r>
+              <a:rPr lang="ko-KR" altLang="en-US" dirty="0" smtClean="0"/>
+              <a:t>참고영상</a:t>
+            </a:r>
+            <a:endParaRPr lang="ko-KR" altLang="en-US" dirty="0"/>
+          </a:p>
+        </p:txBody>
+      </p:sp>
+      <p:sp>
+        <p:nvSpPr>
+          <p:cNvPr id="5" name="내용 개체 틀 2"/>
+          <p:cNvSpPr txBox="1">
+            <a:spLocks/>
+          </p:cNvSpPr>
+          <p:nvPr/>
+        </p:nvSpPr>
+        <p:spPr>
+          <a:xfrm>
+            <a:off x="913794" y="1935921"/>
+            <a:ext cx="10353762" cy="3695136"/>
+          </a:xfrm>
+          <a:prstGeom prst="rect">
+            <a:avLst/>
+          </a:prstGeom>
+        </p:spPr>
+        <p:txBody>
+          <a:bodyPr vert="horz" lIns="91440" tIns="45720" rIns="91440" bIns="45720" rtlCol="0">
+            <a:normAutofit/>
+          </a:bodyPr>
+          <a:lstStyle>
+            <a:lvl1pPr marL="228600" indent="-228600" algn="l" defTabSz="914400" rtl="0" eaLnBrk="1" latinLnBrk="1" hangingPunct="1">
+              <a:lnSpc>
+                <a:spcPct val="120000"/>
+              </a:lnSpc>
+              <a:spcBef>
+                <a:spcPts val="1000"/>
+              </a:spcBef>
+              <a:buFont typeface="Arial" panose="020B0604020202020204" pitchFamily="34" charset="0"/>
+              <a:buChar char="•"/>
+              <a:defRPr sz="2000" kern="1200">
+                <a:solidFill>
+                  <a:schemeClr val="tx1"/>
+                </a:solidFill>
+                <a:effectLst>
+                  <a:outerShdw blurRad="50800" dist="38100" dir="2700000" algn="tl" rotWithShape="0">
+                    <a:srgbClr val="000000">
+                      <a:alpha val="48000"/>
+                    </a:srgbClr>
+                  </a:outerShdw>
+                </a:effectLst>
+                <a:latin typeface="+mn-lt"/>
+                <a:ea typeface="+mn-ea"/>
+                <a:cs typeface="+mn-cs"/>
+              </a:defRPr>
+            </a:lvl1pPr>
+            <a:lvl2pPr marL="685800" indent="-228600" algn="l" defTabSz="914400" rtl="0" eaLnBrk="1" latinLnBrk="1" hangingPunct="1">
+              <a:lnSpc>
+                <a:spcPct val="120000"/>
+              </a:lnSpc>
+              <a:spcBef>
+                <a:spcPts val="500"/>
+              </a:spcBef>
+              <a:buFont typeface="Arial" panose="020B0604020202020204" pitchFamily="34" charset="0"/>
+              <a:buChar char="•"/>
+              <a:defRPr sz="1800" kern="1200">
+                <a:solidFill>
+                  <a:schemeClr val="tx1"/>
+                </a:solidFill>
+                <a:effectLst>
+                  <a:outerShdw blurRad="50800" dist="38100" dir="2700000" algn="tl" rotWithShape="0">
+                    <a:srgbClr val="000000">
+                      <a:alpha val="48000"/>
+                    </a:srgbClr>
+                  </a:outerShdw>
+                </a:effectLst>
+                <a:latin typeface="+mn-lt"/>
+                <a:ea typeface="+mn-ea"/>
+                <a:cs typeface="+mn-cs"/>
+              </a:defRPr>
+            </a:lvl2pPr>
+            <a:lvl3pPr marL="1143000" indent="-228600" algn="l" defTabSz="914400" rtl="0" eaLnBrk="1" latinLnBrk="1" hangingPunct="1">
+              <a:lnSpc>
+                <a:spcPct val="120000"/>
+              </a:lnSpc>
+              <a:spcBef>
+                <a:spcPts val="500"/>
+              </a:spcBef>
+              <a:buFont typeface="Arial" panose="020B0604020202020204" pitchFamily="34" charset="0"/>
+              <a:buChar char="•"/>
+              <a:defRPr sz="1600" kern="1200">
+                <a:solidFill>
+                  <a:schemeClr val="tx1"/>
+                </a:solidFill>
+                <a:effectLst>
+                  <a:outerShdw blurRad="50800" dist="38100" dir="2700000" algn="tl" rotWithShape="0">
+                    <a:srgbClr val="000000">
+                      <a:alpha val="48000"/>
+                    </a:srgbClr>
+                  </a:outerShdw>
+                </a:effectLst>
+                <a:latin typeface="+mn-lt"/>
+                <a:ea typeface="+mn-ea"/>
+                <a:cs typeface="+mn-cs"/>
+              </a:defRPr>
+            </a:lvl3pPr>
+            <a:lvl4pPr marL="1600200" indent="-228600" algn="l" defTabSz="914400" rtl="0" eaLnBrk="1" latinLnBrk="1" hangingPunct="1">
+              <a:lnSpc>
+                <a:spcPct val="120000"/>
+              </a:lnSpc>
+              <a:spcBef>
+                <a:spcPts val="500"/>
+              </a:spcBef>
+              <a:buFont typeface="Arial" panose="020B0604020202020204" pitchFamily="34" charset="0"/>
+              <a:buChar char="•"/>
+              <a:defRPr sz="1400" kern="1200">
+                <a:solidFill>
+                  <a:schemeClr val="tx1"/>
+                </a:solidFill>
+                <a:effectLst>
+                  <a:outerShdw blurRad="50800" dist="38100" dir="2700000" algn="tl" rotWithShape="0">
+                    <a:srgbClr val="000000">
+                      <a:alpha val="48000"/>
+                    </a:srgbClr>
+                  </a:outerShdw>
+                </a:effectLst>
+                <a:latin typeface="+mn-lt"/>
+                <a:ea typeface="+mn-ea"/>
+                <a:cs typeface="+mn-cs"/>
+              </a:defRPr>
+            </a:lvl4pPr>
+            <a:lvl5pPr marL="2057400" indent="-228600" algn="l" defTabSz="914400" rtl="0" eaLnBrk="1" latinLnBrk="1" hangingPunct="1">
+              <a:lnSpc>
+                <a:spcPct val="120000"/>
+              </a:lnSpc>
+              <a:spcBef>
+                <a:spcPts val="500"/>
+              </a:spcBef>
+              <a:buFont typeface="Arial" panose="020B0604020202020204" pitchFamily="34" charset="0"/>
+              <a:buChar char="•"/>
+              <a:defRPr sz="1200" kern="1200">
+                <a:solidFill>
+                  <a:schemeClr val="tx1"/>
+                </a:solidFill>
+                <a:effectLst>
+                  <a:outerShdw blurRad="50800" dist="38100" dir="2700000" algn="tl" rotWithShape="0">
+                    <a:srgbClr val="000000">
+                      <a:alpha val="48000"/>
+                    </a:srgbClr>
+                  </a:outerShdw>
+                </a:effectLst>
+                <a:latin typeface="+mn-lt"/>
+                <a:ea typeface="+mn-ea"/>
+                <a:cs typeface="+mn-cs"/>
+              </a:defRPr>
+            </a:lvl5pPr>
+            <a:lvl6pPr marL="2514600" indent="-228600" algn="l" defTabSz="914400" rtl="0" eaLnBrk="1" latinLnBrk="1" hangingPunct="1">
+              <a:lnSpc>
+                <a:spcPct val="120000"/>
+              </a:lnSpc>
+              <a:spcBef>
+                <a:spcPts val="500"/>
+              </a:spcBef>
+              <a:buFont typeface="Arial" panose="020B0604020202020204" pitchFamily="34" charset="0"/>
+              <a:buChar char="•"/>
+              <a:defRPr sz="1200" kern="1200">
+                <a:solidFill>
+                  <a:schemeClr val="tx1"/>
+                </a:solidFill>
+                <a:effectLst>
+                  <a:outerShdw blurRad="50800" dist="38100" dir="2700000" algn="tl" rotWithShape="0">
+                    <a:srgbClr val="000000">
+                      <a:alpha val="48000"/>
+                    </a:srgbClr>
+                  </a:outerShdw>
+                </a:effectLst>
+                <a:latin typeface="+mn-lt"/>
+                <a:ea typeface="+mn-ea"/>
+                <a:cs typeface="+mn-cs"/>
+              </a:defRPr>
+            </a:lvl6pPr>
+            <a:lvl7pPr marL="2971800" indent="-228600" algn="l" defTabSz="914400" rtl="0" eaLnBrk="1" latinLnBrk="1" hangingPunct="1">
+              <a:lnSpc>
+                <a:spcPct val="120000"/>
+              </a:lnSpc>
+              <a:spcBef>
+                <a:spcPts val="500"/>
+              </a:spcBef>
+              <a:buFont typeface="Arial" panose="020B0604020202020204" pitchFamily="34" charset="0"/>
+              <a:buChar char="•"/>
+              <a:defRPr sz="1200" kern="1200">
+                <a:solidFill>
+                  <a:schemeClr val="tx1"/>
+                </a:solidFill>
+                <a:effectLst>
+                  <a:outerShdw blurRad="50800" dist="38100" dir="2700000" algn="tl" rotWithShape="0">
+                    <a:srgbClr val="000000">
+                      <a:alpha val="48000"/>
+                    </a:srgbClr>
+                  </a:outerShdw>
+                </a:effectLst>
+                <a:latin typeface="+mn-lt"/>
+                <a:ea typeface="+mn-ea"/>
+                <a:cs typeface="+mn-cs"/>
+              </a:defRPr>
+            </a:lvl7pPr>
+            <a:lvl8pPr marL="3429000" indent="-228600" algn="l" defTabSz="914400" rtl="0" eaLnBrk="1" latinLnBrk="1" hangingPunct="1">
+              <a:lnSpc>
+                <a:spcPct val="120000"/>
+              </a:lnSpc>
+              <a:spcBef>
+                <a:spcPts val="500"/>
+              </a:spcBef>
+              <a:buFont typeface="Arial" panose="020B0604020202020204" pitchFamily="34" charset="0"/>
+              <a:buChar char="•"/>
+              <a:defRPr sz="1200" kern="1200">
+                <a:solidFill>
+                  <a:schemeClr val="tx1"/>
+                </a:solidFill>
+                <a:effectLst>
+                  <a:outerShdw blurRad="50800" dist="38100" dir="2700000" algn="tl" rotWithShape="0">
+                    <a:srgbClr val="000000">
+                      <a:alpha val="48000"/>
+                    </a:srgbClr>
+                  </a:outerShdw>
+                </a:effectLst>
+                <a:latin typeface="+mn-lt"/>
+                <a:ea typeface="+mn-ea"/>
+                <a:cs typeface="+mn-cs"/>
+              </a:defRPr>
+            </a:lvl8pPr>
+            <a:lvl9pPr marL="3886200" indent="-228600" algn="l" defTabSz="914400" rtl="0" eaLnBrk="1" latinLnBrk="1" hangingPunct="1">
+              <a:lnSpc>
+                <a:spcPct val="120000"/>
+              </a:lnSpc>
+              <a:spcBef>
+                <a:spcPts val="500"/>
+              </a:spcBef>
+              <a:buFont typeface="Arial" panose="020B0604020202020204" pitchFamily="34" charset="0"/>
+              <a:buChar char="•"/>
+              <a:defRPr sz="1200" kern="1200">
+                <a:solidFill>
+                  <a:schemeClr val="tx1"/>
+                </a:solidFill>
+                <a:effectLst>
+                  <a:outerShdw blurRad="50800" dist="38100" dir="2700000" algn="tl" rotWithShape="0">
+                    <a:srgbClr val="000000">
+                      <a:alpha val="48000"/>
+                    </a:srgbClr>
+                  </a:outerShdw>
+                </a:effectLst>
+                <a:latin typeface="+mn-lt"/>
+                <a:ea typeface="+mn-ea"/>
+                <a:cs typeface="+mn-cs"/>
+              </a:defRPr>
+            </a:lvl9pPr>
+          </a:lstStyle>
+          <a:p>
+            <a:r>
+              <a:rPr lang="ko-KR" altLang="en-US" dirty="0"/>
+              <a:t>밑바닥부터 시작하는 </a:t>
+            </a:r>
+            <a:r>
+              <a:rPr lang="ko-KR" altLang="en-US" dirty="0" err="1" smtClean="0"/>
+              <a:t>딥러닝</a:t>
+            </a:r>
+            <a:endParaRPr lang="en-US" altLang="ko-KR" dirty="0"/>
+          </a:p>
+          <a:p>
+            <a:pPr lvl="1"/>
+            <a:r>
+              <a:rPr lang="ko-KR" altLang="en-US" dirty="0" smtClean="0"/>
+              <a:t>소스코드 </a:t>
+            </a:r>
+            <a:r>
+              <a:rPr lang="en-US" altLang="ko-KR" dirty="0" smtClean="0"/>
+              <a:t>URL</a:t>
+            </a:r>
+            <a:r>
+              <a:rPr lang="ko-KR" altLang="en-US" dirty="0" smtClean="0"/>
+              <a:t>에 포함</a:t>
+            </a:r>
+            <a:endParaRPr lang="en-US" altLang="ko-KR" dirty="0" smtClean="0"/>
+          </a:p>
+          <a:p>
             <a:r>
               <a:rPr lang="ko-KR" altLang="en-US" dirty="0" err="1" smtClean="0"/>
               <a:t>퍼셉트론</a:t>
@@ -6152,8 +7511,28 @@
               <a:buAutoNum type="arabicPeriod"/>
             </a:pPr>
             <a:r>
+              <a:rPr lang="ko-KR" altLang="en-US" dirty="0" smtClean="0"/>
+              <a:t>소스코드</a:t>
+            </a:r>
+            <a:r>
+              <a:rPr lang="en-US" altLang="ko-KR" dirty="0"/>
+              <a:t> </a:t>
+            </a:r>
+            <a:r>
+              <a:rPr lang="ko-KR" altLang="en-US" dirty="0" smtClean="0"/>
+              <a:t>참고</a:t>
+            </a:r>
+            <a:r>
+              <a:rPr lang="en-US" altLang="ko-KR" dirty="0" smtClean="0"/>
+              <a:t>: </a:t>
+            </a:r>
+            <a:r>
+              <a:rPr lang="ko-KR" altLang="en-US" dirty="0" smtClean="0"/>
+              <a:t>밑바닥부터 시작하는 </a:t>
+            </a:r>
+            <a:r>
               <a:rPr lang="ko-KR" altLang="en-US" dirty="0" err="1" smtClean="0"/>
-              <a:t>퍼셉트론</a:t>
+              <a:t>딥러닝</a:t>
             </a:r>
             <a:endParaRPr lang="en-US" altLang="ko-KR" dirty="0" smtClean="0"/>
           </a:p>
@@ -6163,13 +7542,10 @@
               <a:buAutoNum type="arabicPeriod"/>
             </a:pPr>
             <a:r>
-              <a:rPr lang="en-US" altLang="ko-KR" dirty="0" smtClean="0"/>
-              <a:t>EXAMPLE 1) AND</a:t>
-            </a:r>
-            <a:r>
-              <a:rPr lang="en-US" altLang="ko-KR" dirty="0" smtClean="0"/>
-              <a:t>, OR, NAND, XOR</a:t>
-            </a:r>
+              <a:rPr lang="ko-KR" altLang="en-US" dirty="0" err="1" smtClean="0"/>
+              <a:t>퍼셉트론</a:t>
+            </a:r>
+            <a:endParaRPr lang="en-US" altLang="ko-KR" dirty="0" smtClean="0"/>
           </a:p>
           <a:p>
             <a:pPr marL="514350" indent="-514350">
@@ -6177,10 +7553,20 @@
               <a:buAutoNum type="arabicPeriod"/>
             </a:pPr>
             <a:r>
+              <a:rPr lang="en-US" altLang="ko-KR" dirty="0" smtClean="0"/>
+              <a:t>EXAMPLE 1) AND, OR, NAND, XOR</a:t>
+            </a:r>
+          </a:p>
+          <a:p>
+            <a:pPr marL="514350" indent="-514350">
+              <a:buFont typeface="+mj-lt"/>
+              <a:buAutoNum type="arabicPeriod"/>
+            </a:pPr>
+            <a:r>
               <a:rPr lang="ko-KR" altLang="en-US" dirty="0" smtClean="0"/>
               <a:t>참고문헌</a:t>
             </a:r>
-            <a:endParaRPr lang="ko-KR" altLang="en-US" dirty="0"/>
+            <a:endParaRPr lang="en-US" altLang="ko-KR" dirty="0" smtClean="0"/>
           </a:p>
         </p:txBody>
       </p:sp>
@@ -6205,6 +7591,157 @@
 </file>
 
 <file path=ppt/slides/slide3.xml><?xml version="1.0" encoding="utf-8"?>
+<p:sld xmlns:a="http://schemas.openxmlformats.org/drawingml/2006/main" xmlns:r="http://schemas.openxmlformats.org/officeDocument/2006/relationships" xmlns:p="http://schemas.openxmlformats.org/presentationml/2006/main">
+  <p:cSld>
+    <p:spTree>
+      <p:nvGrpSpPr>
+        <p:cNvPr id="1" name=""/>
+        <p:cNvGrpSpPr/>
+        <p:nvPr/>
+      </p:nvGrpSpPr>
+      <p:grpSpPr>
+        <a:xfrm>
+          <a:off x="0" y="0"/>
+          <a:ext cx="0" cy="0"/>
+          <a:chOff x="0" y="0"/>
+          <a:chExt cx="0" cy="0"/>
+        </a:xfrm>
+      </p:grpSpPr>
+      <p:sp>
+        <p:nvSpPr>
+          <p:cNvPr id="2" name="제목 1"/>
+          <p:cNvSpPr>
+            <a:spLocks noGrp="1"/>
+          </p:cNvSpPr>
+          <p:nvPr>
+            <p:ph type="title"/>
+          </p:nvPr>
+        </p:nvSpPr>
+        <p:spPr/>
+        <p:txBody>
+          <a:bodyPr/>
+          <a:lstStyle/>
+          <a:p>
+            <a:r>
+              <a:rPr lang="ko-KR" altLang="en-US" dirty="0"/>
+              <a:t>소스코드</a:t>
+            </a:r>
+            <a:r>
+              <a:rPr lang="en-US" altLang="ko-KR" dirty="0"/>
+              <a:t> </a:t>
+            </a:r>
+            <a:r>
+              <a:rPr lang="ko-KR" altLang="en-US" dirty="0"/>
+              <a:t>참고</a:t>
+            </a:r>
+            <a:r>
+              <a:rPr lang="en-US" altLang="ko-KR" dirty="0"/>
+              <a:t>: </a:t>
+            </a:r>
+            <a:r>
+              <a:rPr lang="ko-KR" altLang="en-US" dirty="0"/>
+              <a:t>밑바닥부터 시작하는 </a:t>
+            </a:r>
+            <a:r>
+              <a:rPr lang="ko-KR" altLang="en-US" dirty="0" err="1"/>
+              <a:t>딥러닝</a:t>
+            </a:r>
+            <a:endParaRPr lang="en-US" altLang="ko-KR" dirty="0"/>
+          </a:p>
+        </p:txBody>
+      </p:sp>
+      <p:sp>
+        <p:nvSpPr>
+          <p:cNvPr id="6" name="내용 개체 틀 3"/>
+          <p:cNvSpPr>
+            <a:spLocks noGrp="1"/>
+          </p:cNvSpPr>
+          <p:nvPr>
+            <p:ph idx="1"/>
+          </p:nvPr>
+        </p:nvSpPr>
+        <p:spPr>
+          <a:xfrm>
+            <a:off x="838200" y="1825625"/>
+            <a:ext cx="10429356" cy="4351338"/>
+          </a:xfrm>
+        </p:spPr>
+        <p:txBody>
+          <a:bodyPr>
+            <a:normAutofit/>
+          </a:bodyPr>
+          <a:lstStyle/>
+          <a:p>
+            <a:r>
+              <a:rPr lang="en-US" altLang="ko-KR" dirty="0">
+                <a:hlinkClick r:id="rId2"/>
+              </a:rPr>
+              <a:t>https://</a:t>
+            </a:r>
+            <a:r>
+              <a:rPr lang="en-US" altLang="ko-KR" dirty="0" smtClean="0">
+                <a:hlinkClick r:id="rId2"/>
+              </a:rPr>
+              <a:t>github.com/WegraLee/deep-learning-from-scratch</a:t>
+            </a:r>
+            <a:endParaRPr lang="en-US" altLang="ko-KR" dirty="0" smtClean="0"/>
+          </a:p>
+          <a:p>
+            <a:endParaRPr lang="en-US" altLang="ko-KR" dirty="0"/>
+          </a:p>
+        </p:txBody>
+      </p:sp>
+      <p:pic>
+        <p:nvPicPr>
+          <p:cNvPr id="8" name="그림 7"/>
+          <p:cNvPicPr>
+            <a:picLocks noChangeAspect="1"/>
+          </p:cNvPicPr>
+          <p:nvPr/>
+        </p:nvPicPr>
+        <p:blipFill>
+          <a:blip r:embed="rId3" cstate="print">
+            <a:extLst>
+              <a:ext uri="{28A0092B-C50C-407E-A947-70E740481C1C}">
+                <a14:useLocalDpi xmlns:a14="http://schemas.microsoft.com/office/drawing/2010/main" val="0"/>
+              </a:ext>
+            </a:extLst>
+          </a:blip>
+          <a:stretch>
+            <a:fillRect/>
+          </a:stretch>
+        </p:blipFill>
+        <p:spPr>
+          <a:xfrm>
+            <a:off x="8049676" y="1935921"/>
+            <a:ext cx="3217880" cy="4490577"/>
+          </a:xfrm>
+          <a:prstGeom prst="rect">
+            <a:avLst/>
+          </a:prstGeom>
+        </p:spPr>
+      </p:pic>
+    </p:spTree>
+    <p:extLst>
+      <p:ext uri="{BB962C8B-B14F-4D97-AF65-F5344CB8AC3E}">
+        <p14:creationId xmlns:p14="http://schemas.microsoft.com/office/powerpoint/2010/main" val="4143695950"/>
+      </p:ext>
+    </p:extLst>
+  </p:cSld>
+  <p:clrMapOvr>
+    <a:masterClrMapping/>
+  </p:clrMapOvr>
+  <p:timing>
+    <p:tnLst>
+      <p:par>
+        <p:cTn id="1" dur="indefinite" restart="never" nodeType="tmRoot"/>
+      </p:par>
+    </p:tnLst>
+  </p:timing>
+</p:sld>
+</file>
+
+<file path=ppt/slides/slide4.xml><?xml version="1.0" encoding="utf-8"?>
 <p:sld xmlns:a="http://schemas.openxmlformats.org/drawingml/2006/main" xmlns:r="http://schemas.openxmlformats.org/officeDocument/2006/relationships" xmlns:p="http://schemas.openxmlformats.org/presentationml/2006/main">
   <p:cSld>
     <p:spTree>
@@ -6368,7 +7905,7 @@
     </p:spTree>
     <p:extLst>
       <p:ext uri="{BB962C8B-B14F-4D97-AF65-F5344CB8AC3E}">
-        <p14:creationId xmlns:p14="http://schemas.microsoft.com/office/powerpoint/2010/main" val="4143695950"/>
+        <p14:creationId xmlns:p14="http://schemas.microsoft.com/office/powerpoint/2010/main" val="4280702599"/>
       </p:ext>
     </p:extLst>
   </p:cSld>
@@ -6385,7 +7922,7 @@
 </p:sld>
 </file>
 
-<file path=ppt/slides/slide4.xml><?xml version="1.0" encoding="utf-8"?>
+<file path=ppt/slides/slide5.xml><?xml version="1.0" encoding="utf-8"?>
 <p:sld xmlns:a="http://schemas.openxmlformats.org/drawingml/2006/main" xmlns:r="http://schemas.openxmlformats.org/officeDocument/2006/relationships" xmlns:p="http://schemas.openxmlformats.org/presentationml/2006/main">
   <p:cSld>
     <p:spTree>
@@ -6491,11 +8028,7 @@
             </a:r>
             <a:r>
               <a:rPr lang="ko-KR" altLang="en-US" dirty="0" smtClean="0"/>
-              <a:t>축색</a:t>
-            </a:r>
-            <a:r>
-              <a:rPr lang="ko-KR" altLang="en-US" dirty="0" smtClean="0"/>
-              <a:t>돌기</a:t>
+              <a:t>축색돌기</a:t>
             </a:r>
             <a:r>
               <a:rPr lang="en-US" altLang="ko-KR" dirty="0" smtClean="0"/>
@@ -6590,7 +8123,7 @@
 </p:sld>
 </file>
 
-<file path=ppt/slides/slide5.xml><?xml version="1.0" encoding="utf-8"?>
+<file path=ppt/slides/slide6.xml><?xml version="1.0" encoding="utf-8"?>
 <p:sld xmlns:a="http://schemas.openxmlformats.org/drawingml/2006/main" xmlns:r="http://schemas.openxmlformats.org/officeDocument/2006/relationships" xmlns:p="http://schemas.openxmlformats.org/presentationml/2006/main">
   <p:cSld>
     <p:spTree>
@@ -6801,7 +8334,7 @@
 </p:sld>
 </file>
 
-<file path=ppt/slides/slide6.xml><?xml version="1.0" encoding="utf-8"?>
+<file path=ppt/slides/slide7.xml><?xml version="1.0" encoding="utf-8"?>
 <p:sld xmlns:a="http://schemas.openxmlformats.org/drawingml/2006/main" xmlns:r="http://schemas.openxmlformats.org/officeDocument/2006/relationships" xmlns:p="http://schemas.openxmlformats.org/presentationml/2006/main">
   <p:cSld>
     <p:spTree>
@@ -6841,8 +8374,8 @@
           </a:p>
         </p:txBody>
       </p:sp>
-      <mc:AlternateContent xmlns:mc="http://schemas.openxmlformats.org/markup-compatibility/2006">
-        <mc:Choice xmlns:a14="http://schemas.microsoft.com/office/drawing/2010/main" Requires="a14">
+      <mc:AlternateContent xmlns:mc="http://schemas.openxmlformats.org/markup-compatibility/2006" xmlns:a14="http://schemas.microsoft.com/office/drawing/2010/main">
+        <mc:Choice Requires="a14">
           <p:sp>
             <p:nvSpPr>
               <p:cNvPr id="6" name="내용 개체 틀 3"/>
@@ -6991,7 +8524,7 @@
             </p:txBody>
           </p:sp>
         </mc:Choice>
-        <mc:Fallback>
+        <mc:Fallback xmlns="">
           <p:sp>
             <p:nvSpPr>
               <p:cNvPr id="6" name="내용 개체 틀 3"/>
@@ -7038,7 +8571,7 @@
           <p:nvPr/>
         </p:nvPicPr>
         <p:blipFill rotWithShape="1">
-          <a:blip r:embed="rId3">
+          <a:blip r:embed="rId2">
             <a:extLst>
               <a:ext uri="{28A0092B-C50C-407E-A947-70E740481C1C}">
                 <a14:useLocalDpi xmlns:a14="http://schemas.microsoft.com/office/drawing/2010/main" val="0"/>
@@ -7101,7 +8634,7 @@
 </p:sld>
 </file>
 
-<file path=ppt/slides/slide7.xml><?xml version="1.0" encoding="utf-8"?>
+<file path=ppt/slides/slide8.xml><?xml version="1.0" encoding="utf-8"?>
 <p:sld xmlns:a="http://schemas.openxmlformats.org/drawingml/2006/main" xmlns:r="http://schemas.openxmlformats.org/officeDocument/2006/relationships" xmlns:p="http://schemas.openxmlformats.org/presentationml/2006/main">
   <p:cSld>
     <p:spTree>
@@ -7141,8 +8674,8 @@
           </a:p>
         </p:txBody>
       </p:sp>
-      <mc:AlternateContent xmlns:mc="http://schemas.openxmlformats.org/markup-compatibility/2006">
-        <mc:Choice xmlns:a14="http://schemas.microsoft.com/office/drawing/2010/main" Requires="a14">
+      <mc:AlternateContent xmlns:mc="http://schemas.openxmlformats.org/markup-compatibility/2006" xmlns:a14="http://schemas.microsoft.com/office/drawing/2010/main">
+        <mc:Choice Requires="a14">
           <p:sp>
             <p:nvSpPr>
               <p:cNvPr id="6" name="내용 개체 틀 3"/>
@@ -7183,11 +8716,7 @@
                 </a:r>
                 <a:r>
                   <a:rPr lang="ko-KR" altLang="en-US" sz="2200" dirty="0" smtClean="0"/>
-                  <a:t>가</a:t>
-                </a:r>
-                <a:r>
-                  <a:rPr lang="ko-KR" altLang="en-US" sz="2200" dirty="0" smtClean="0"/>
-                  <a:t> 커지면 커질수록 수식으로 표현</a:t>
+                  <a:t>가 커지면 커질수록 수식으로 표현</a:t>
                 </a:r>
                 <a:endParaRPr lang="en-US" altLang="ko-KR" sz="2200" dirty="0" smtClean="0"/>
               </a:p>
@@ -7514,7 +9043,7 @@
             </p:txBody>
           </p:sp>
         </mc:Choice>
-        <mc:Fallback>
+        <mc:Fallback xmlns="">
           <p:sp>
             <p:nvSpPr>
               <p:cNvPr id="6" name="내용 개체 틀 3"/>
@@ -7624,7 +9153,7 @@
 </p:sld>
 </file>
 
-<file path=ppt/slides/slide8.xml><?xml version="1.0" encoding="utf-8"?>
+<file path=ppt/slides/slide9.xml><?xml version="1.0" encoding="utf-8"?>
 <p:sld xmlns:a="http://schemas.openxmlformats.org/drawingml/2006/main" xmlns:r="http://schemas.openxmlformats.org/officeDocument/2006/relationships" xmlns:p="http://schemas.openxmlformats.org/presentationml/2006/main">
   <p:cSld>
     <p:spTree>
@@ -8274,423 +9803,6 @@
 </p:sld>
 </file>
 
-<file path=ppt/slides/slide9.xml><?xml version="1.0" encoding="utf-8"?>
-<p:sld xmlns:a="http://schemas.openxmlformats.org/drawingml/2006/main" xmlns:r="http://schemas.openxmlformats.org/officeDocument/2006/relationships" xmlns:p="http://schemas.openxmlformats.org/presentationml/2006/main">
-  <p:cSld>
-    <p:spTree>
-      <p:nvGrpSpPr>
-        <p:cNvPr id="1" name=""/>
-        <p:cNvGrpSpPr/>
-        <p:nvPr/>
-      </p:nvGrpSpPr>
-      <p:grpSpPr>
-        <a:xfrm>
-          <a:off x="0" y="0"/>
-          <a:ext cx="0" cy="0"/>
-          <a:chOff x="0" y="0"/>
-          <a:chExt cx="0" cy="0"/>
-        </a:xfrm>
-      </p:grpSpPr>
-      <p:sp>
-        <p:nvSpPr>
-          <p:cNvPr id="2" name="제목 1"/>
-          <p:cNvSpPr>
-            <a:spLocks noGrp="1"/>
-          </p:cNvSpPr>
-          <p:nvPr>
-            <p:ph type="title"/>
-          </p:nvPr>
-        </p:nvSpPr>
-        <p:spPr/>
-        <p:txBody>
-          <a:bodyPr/>
-          <a:lstStyle/>
-          <a:p>
-            <a:r>
-              <a:rPr lang="ko-KR" altLang="en-US" dirty="0" smtClean="0"/>
-              <a:t>참고문헌</a:t>
-            </a:r>
-            <a:endParaRPr lang="ko-KR" altLang="en-US" dirty="0"/>
-          </a:p>
-        </p:txBody>
-      </p:sp>
-      <p:sp>
-        <p:nvSpPr>
-          <p:cNvPr id="5" name="내용 개체 틀 2"/>
-          <p:cNvSpPr txBox="1">
-            <a:spLocks/>
-          </p:cNvSpPr>
-          <p:nvPr/>
-        </p:nvSpPr>
-        <p:spPr>
-          <a:xfrm>
-            <a:off x="913794" y="1935921"/>
-            <a:ext cx="10353762" cy="3695136"/>
-          </a:xfrm>
-          <a:prstGeom prst="rect">
-            <a:avLst/>
-          </a:prstGeom>
-        </p:spPr>
-        <p:txBody>
-          <a:bodyPr vert="horz" lIns="91440" tIns="45720" rIns="91440" bIns="45720" rtlCol="0">
-            <a:normAutofit/>
-          </a:bodyPr>
-          <a:lstStyle>
-            <a:lvl1pPr marL="228600" indent="-228600" algn="l" defTabSz="914400" rtl="0" eaLnBrk="1" latinLnBrk="1" hangingPunct="1">
-              <a:lnSpc>
-                <a:spcPct val="120000"/>
-              </a:lnSpc>
-              <a:spcBef>
-                <a:spcPts val="1000"/>
-              </a:spcBef>
-              <a:buFont typeface="Arial" panose="020B0604020202020204" pitchFamily="34" charset="0"/>
-              <a:buChar char="•"/>
-              <a:defRPr sz="2000" kern="1200">
-                <a:solidFill>
-                  <a:schemeClr val="tx1"/>
-                </a:solidFill>
-                <a:effectLst>
-                  <a:outerShdw blurRad="50800" dist="38100" dir="2700000" algn="tl" rotWithShape="0">
-                    <a:srgbClr val="000000">
-                      <a:alpha val="48000"/>
-                    </a:srgbClr>
-                  </a:outerShdw>
-                </a:effectLst>
-                <a:latin typeface="+mn-lt"/>
-                <a:ea typeface="+mn-ea"/>
-                <a:cs typeface="+mn-cs"/>
-              </a:defRPr>
-            </a:lvl1pPr>
-            <a:lvl2pPr marL="685800" indent="-228600" algn="l" defTabSz="914400" rtl="0" eaLnBrk="1" latinLnBrk="1" hangingPunct="1">
-              <a:lnSpc>
-                <a:spcPct val="120000"/>
-              </a:lnSpc>
-              <a:spcBef>
-                <a:spcPts val="500"/>
-              </a:spcBef>
-              <a:buFont typeface="Arial" panose="020B0604020202020204" pitchFamily="34" charset="0"/>
-              <a:buChar char="•"/>
-              <a:defRPr sz="1800" kern="1200">
-                <a:solidFill>
-                  <a:schemeClr val="tx1"/>
-                </a:solidFill>
-                <a:effectLst>
-                  <a:outerShdw blurRad="50800" dist="38100" dir="2700000" algn="tl" rotWithShape="0">
-                    <a:srgbClr val="000000">
-                      <a:alpha val="48000"/>
-                    </a:srgbClr>
-                  </a:outerShdw>
-                </a:effectLst>
-                <a:latin typeface="+mn-lt"/>
-                <a:ea typeface="+mn-ea"/>
-                <a:cs typeface="+mn-cs"/>
-              </a:defRPr>
-            </a:lvl2pPr>
-            <a:lvl3pPr marL="1143000" indent="-228600" algn="l" defTabSz="914400" rtl="0" eaLnBrk="1" latinLnBrk="1" hangingPunct="1">
-              <a:lnSpc>
-                <a:spcPct val="120000"/>
-              </a:lnSpc>
-              <a:spcBef>
-                <a:spcPts val="500"/>
-              </a:spcBef>
-              <a:buFont typeface="Arial" panose="020B0604020202020204" pitchFamily="34" charset="0"/>
-              <a:buChar char="•"/>
-              <a:defRPr sz="1600" kern="1200">
-                <a:solidFill>
-                  <a:schemeClr val="tx1"/>
-                </a:solidFill>
-                <a:effectLst>
-                  <a:outerShdw blurRad="50800" dist="38100" dir="2700000" algn="tl" rotWithShape="0">
-                    <a:srgbClr val="000000">
-                      <a:alpha val="48000"/>
-                    </a:srgbClr>
-                  </a:outerShdw>
-                </a:effectLst>
-                <a:latin typeface="+mn-lt"/>
-                <a:ea typeface="+mn-ea"/>
-                <a:cs typeface="+mn-cs"/>
-              </a:defRPr>
-            </a:lvl3pPr>
-            <a:lvl4pPr marL="1600200" indent="-228600" algn="l" defTabSz="914400" rtl="0" eaLnBrk="1" latinLnBrk="1" hangingPunct="1">
-              <a:lnSpc>
-                <a:spcPct val="120000"/>
-              </a:lnSpc>
-              <a:spcBef>
-                <a:spcPts val="500"/>
-              </a:spcBef>
-              <a:buFont typeface="Arial" panose="020B0604020202020204" pitchFamily="34" charset="0"/>
-              <a:buChar char="•"/>
-              <a:defRPr sz="1400" kern="1200">
-                <a:solidFill>
-                  <a:schemeClr val="tx1"/>
-                </a:solidFill>
-                <a:effectLst>
-                  <a:outerShdw blurRad="50800" dist="38100" dir="2700000" algn="tl" rotWithShape="0">
-                    <a:srgbClr val="000000">
-                      <a:alpha val="48000"/>
-                    </a:srgbClr>
-                  </a:outerShdw>
-                </a:effectLst>
-                <a:latin typeface="+mn-lt"/>
-                <a:ea typeface="+mn-ea"/>
-                <a:cs typeface="+mn-cs"/>
-              </a:defRPr>
-            </a:lvl4pPr>
-            <a:lvl5pPr marL="2057400" indent="-228600" algn="l" defTabSz="914400" rtl="0" eaLnBrk="1" latinLnBrk="1" hangingPunct="1">
-              <a:lnSpc>
-                <a:spcPct val="120000"/>
-              </a:lnSpc>
-              <a:spcBef>
-                <a:spcPts val="500"/>
-              </a:spcBef>
-              <a:buFont typeface="Arial" panose="020B0604020202020204" pitchFamily="34" charset="0"/>
-              <a:buChar char="•"/>
-              <a:defRPr sz="1200" kern="1200">
-                <a:solidFill>
-                  <a:schemeClr val="tx1"/>
-                </a:solidFill>
-                <a:effectLst>
-                  <a:outerShdw blurRad="50800" dist="38100" dir="2700000" algn="tl" rotWithShape="0">
-                    <a:srgbClr val="000000">
-                      <a:alpha val="48000"/>
-                    </a:srgbClr>
-                  </a:outerShdw>
-                </a:effectLst>
-                <a:latin typeface="+mn-lt"/>
-                <a:ea typeface="+mn-ea"/>
-                <a:cs typeface="+mn-cs"/>
-              </a:defRPr>
-            </a:lvl5pPr>
-            <a:lvl6pPr marL="2514600" indent="-228600" algn="l" defTabSz="914400" rtl="0" eaLnBrk="1" latinLnBrk="1" hangingPunct="1">
-              <a:lnSpc>
-                <a:spcPct val="120000"/>
-              </a:lnSpc>
-              <a:spcBef>
-                <a:spcPts val="500"/>
-              </a:spcBef>
-              <a:buFont typeface="Arial" panose="020B0604020202020204" pitchFamily="34" charset="0"/>
-              <a:buChar char="•"/>
-              <a:defRPr sz="1200" kern="1200">
-                <a:solidFill>
-                  <a:schemeClr val="tx1"/>
-                </a:solidFill>
-                <a:effectLst>
-                  <a:outerShdw blurRad="50800" dist="38100" dir="2700000" algn="tl" rotWithShape="0">
-                    <a:srgbClr val="000000">
-                      <a:alpha val="48000"/>
-                    </a:srgbClr>
-                  </a:outerShdw>
-                </a:effectLst>
-                <a:latin typeface="+mn-lt"/>
-                <a:ea typeface="+mn-ea"/>
-                <a:cs typeface="+mn-cs"/>
-              </a:defRPr>
-            </a:lvl6pPr>
-            <a:lvl7pPr marL="2971800" indent="-228600" algn="l" defTabSz="914400" rtl="0" eaLnBrk="1" latinLnBrk="1" hangingPunct="1">
-              <a:lnSpc>
-                <a:spcPct val="120000"/>
-              </a:lnSpc>
-              <a:spcBef>
-                <a:spcPts val="500"/>
-              </a:spcBef>
-              <a:buFont typeface="Arial" panose="020B0604020202020204" pitchFamily="34" charset="0"/>
-              <a:buChar char="•"/>
-              <a:defRPr sz="1200" kern="1200">
-                <a:solidFill>
-                  <a:schemeClr val="tx1"/>
-                </a:solidFill>
-                <a:effectLst>
-                  <a:outerShdw blurRad="50800" dist="38100" dir="2700000" algn="tl" rotWithShape="0">
-                    <a:srgbClr val="000000">
-                      <a:alpha val="48000"/>
-                    </a:srgbClr>
-                  </a:outerShdw>
-                </a:effectLst>
-                <a:latin typeface="+mn-lt"/>
-                <a:ea typeface="+mn-ea"/>
-                <a:cs typeface="+mn-cs"/>
-              </a:defRPr>
-            </a:lvl7pPr>
-            <a:lvl8pPr marL="3429000" indent="-228600" algn="l" defTabSz="914400" rtl="0" eaLnBrk="1" latinLnBrk="1" hangingPunct="1">
-              <a:lnSpc>
-                <a:spcPct val="120000"/>
-              </a:lnSpc>
-              <a:spcBef>
-                <a:spcPts val="500"/>
-              </a:spcBef>
-              <a:buFont typeface="Arial" panose="020B0604020202020204" pitchFamily="34" charset="0"/>
-              <a:buChar char="•"/>
-              <a:defRPr sz="1200" kern="1200">
-                <a:solidFill>
-                  <a:schemeClr val="tx1"/>
-                </a:solidFill>
-                <a:effectLst>
-                  <a:outerShdw blurRad="50800" dist="38100" dir="2700000" algn="tl" rotWithShape="0">
-                    <a:srgbClr val="000000">
-                      <a:alpha val="48000"/>
-                    </a:srgbClr>
-                  </a:outerShdw>
-                </a:effectLst>
-                <a:latin typeface="+mn-lt"/>
-                <a:ea typeface="+mn-ea"/>
-                <a:cs typeface="+mn-cs"/>
-              </a:defRPr>
-            </a:lvl8pPr>
-            <a:lvl9pPr marL="3886200" indent="-228600" algn="l" defTabSz="914400" rtl="0" eaLnBrk="1" latinLnBrk="1" hangingPunct="1">
-              <a:lnSpc>
-                <a:spcPct val="120000"/>
-              </a:lnSpc>
-              <a:spcBef>
-                <a:spcPts val="500"/>
-              </a:spcBef>
-              <a:buFont typeface="Arial" panose="020B0604020202020204" pitchFamily="34" charset="0"/>
-              <a:buChar char="•"/>
-              <a:defRPr sz="1200" kern="1200">
-                <a:solidFill>
-                  <a:schemeClr val="tx1"/>
-                </a:solidFill>
-                <a:effectLst>
-                  <a:outerShdw blurRad="50800" dist="38100" dir="2700000" algn="tl" rotWithShape="0">
-                    <a:srgbClr val="000000">
-                      <a:alpha val="48000"/>
-                    </a:srgbClr>
-                  </a:outerShdw>
-                </a:effectLst>
-                <a:latin typeface="+mn-lt"/>
-                <a:ea typeface="+mn-ea"/>
-                <a:cs typeface="+mn-cs"/>
-              </a:defRPr>
-            </a:lvl9pPr>
-          </a:lstStyle>
-          <a:p>
-            <a:pPr marL="457200" indent="-457200">
-              <a:buFont typeface="+mj-lt"/>
-              <a:buAutoNum type="arabicPeriod"/>
-            </a:pPr>
-            <a:r>
-              <a:rPr lang="ko-KR" altLang="en-US" dirty="0" err="1" smtClean="0"/>
-              <a:t>사이토</a:t>
-            </a:r>
-            <a:r>
-              <a:rPr lang="ko-KR" altLang="en-US" dirty="0" smtClean="0"/>
-              <a:t> </a:t>
-            </a:r>
-            <a:r>
-              <a:rPr lang="ko-KR" altLang="en-US" dirty="0" err="1" smtClean="0"/>
-              <a:t>고키</a:t>
-            </a:r>
-            <a:r>
-              <a:rPr lang="en-US" altLang="ko-KR" dirty="0" smtClean="0"/>
-              <a:t>, “</a:t>
-            </a:r>
-            <a:r>
-              <a:rPr lang="ko-KR" altLang="en-US" dirty="0" smtClean="0"/>
-              <a:t>밑바닥부터 </a:t>
-            </a:r>
-            <a:r>
-              <a:rPr lang="ko-KR" altLang="en-US" dirty="0" smtClean="0"/>
-              <a:t>시작하는 </a:t>
-            </a:r>
-            <a:r>
-              <a:rPr lang="ko-KR" altLang="en-US" dirty="0" err="1" smtClean="0"/>
-              <a:t>딥러닝</a:t>
-            </a:r>
-            <a:r>
-              <a:rPr lang="en-US" altLang="ko-KR" dirty="0" smtClean="0"/>
-              <a:t>”, </a:t>
-            </a:r>
-            <a:r>
-              <a:rPr lang="ko-KR" altLang="en-US" dirty="0" err="1" smtClean="0"/>
-              <a:t>오레일리</a:t>
-            </a:r>
-            <a:r>
-              <a:rPr lang="en-US" altLang="ko-KR" dirty="0" smtClean="0"/>
-              <a:t>, 2016.</a:t>
-            </a:r>
-          </a:p>
-          <a:p>
-            <a:pPr marL="0" indent="0">
-              <a:buNone/>
-            </a:pPr>
-            <a:r>
-              <a:rPr lang="en-US" altLang="ko-KR" dirty="0" smtClean="0"/>
-              <a:t>        (</a:t>
-            </a:r>
-            <a:r>
-              <a:rPr lang="ko-KR" altLang="en-US" dirty="0" smtClean="0"/>
-              <a:t>역</a:t>
-            </a:r>
-            <a:r>
-              <a:rPr lang="en-US" altLang="ko-KR" dirty="0" smtClean="0"/>
-              <a:t>: </a:t>
-            </a:r>
-            <a:r>
-              <a:rPr lang="ko-KR" altLang="en-US" dirty="0" err="1" smtClean="0"/>
-              <a:t>개앞맵시</a:t>
-            </a:r>
-            <a:r>
-              <a:rPr lang="en-US" altLang="ko-KR" dirty="0" smtClean="0"/>
-              <a:t>, </a:t>
-            </a:r>
-            <a:r>
-              <a:rPr lang="ko-KR" altLang="en-US" dirty="0" smtClean="0"/>
-              <a:t>번역 출판</a:t>
-            </a:r>
-            <a:r>
-              <a:rPr lang="en-US" altLang="ko-KR" dirty="0" smtClean="0"/>
-              <a:t>: </a:t>
-            </a:r>
-            <a:r>
-              <a:rPr lang="ko-KR" altLang="en-US" dirty="0" err="1" smtClean="0"/>
-              <a:t>한빛미디어</a:t>
-            </a:r>
-            <a:r>
-              <a:rPr lang="en-US" altLang="ko-KR" dirty="0" smtClean="0"/>
-              <a:t>)</a:t>
-            </a:r>
-          </a:p>
-          <a:p>
-            <a:pPr marL="457200" indent="-457200">
-              <a:buFont typeface="+mj-lt"/>
-              <a:buAutoNum type="arabicPeriod" startAt="2"/>
-            </a:pPr>
-            <a:endParaRPr lang="en-US" altLang="ko-KR" dirty="0" smtClean="0"/>
-          </a:p>
-          <a:p>
-            <a:pPr marL="457200" indent="-457200">
-              <a:buFont typeface="+mj-lt"/>
-              <a:buAutoNum type="arabicPeriod" startAt="2"/>
-            </a:pPr>
-            <a:endParaRPr lang="en-US" altLang="ko-KR" dirty="0" smtClean="0"/>
-          </a:p>
-          <a:p>
-            <a:endParaRPr lang="en-US" altLang="ko-KR" dirty="0" smtClean="0"/>
-          </a:p>
-          <a:p>
-            <a:endParaRPr lang="en-US" altLang="ko-KR" dirty="0" smtClean="0"/>
-          </a:p>
-        </p:txBody>
-      </p:sp>
-    </p:spTree>
-    <p:extLst>
-      <p:ext uri="{BB962C8B-B14F-4D97-AF65-F5344CB8AC3E}">
-        <p14:creationId xmlns:p14="http://schemas.microsoft.com/office/powerpoint/2010/main" val="3102446479"/>
-      </p:ext>
-    </p:extLst>
-  </p:cSld>
-  <p:clrMapOvr>
-    <a:masterClrMapping/>
-  </p:clrMapOvr>
-  <p:timing>
-    <p:tnLst>
-      <p:par>
-        <p:cTn id="1" dur="indefinite" restart="never" nodeType="tmRoot"/>
-      </p:par>
-    </p:tnLst>
-  </p:timing>
-</p:sld>
-</file>
-
 <file path=ppt/theme/theme1.xml><?xml version="1.0" encoding="utf-8"?>
 <a:theme xmlns:a="http://schemas.openxmlformats.org/drawingml/2006/main" name="Damask">
   <a:themeElements>

</xml_diff>